<commit_message>
Added slides explaining what is version control with images
</commit_message>
<xml_diff>
--- a/Git_Presentation.pptx
+++ b/Git_Presentation.pptx
@@ -9,9 +9,12 @@
     <p:sldId id="257" r:id="rId3"/>
     <p:sldId id="261" r:id="rId4"/>
     <p:sldId id="258" r:id="rId5"/>
-    <p:sldId id="262" r:id="rId6"/>
-    <p:sldId id="260" r:id="rId7"/>
-    <p:sldId id="259" r:id="rId8"/>
+    <p:sldId id="263" r:id="rId6"/>
+    <p:sldId id="264" r:id="rId7"/>
+    <p:sldId id="262" r:id="rId8"/>
+    <p:sldId id="260" r:id="rId9"/>
+    <p:sldId id="259" r:id="rId10"/>
+    <p:sldId id="265" r:id="rId11"/>
   </p:sldIdLst>
   <p:sldSz cx="12192000" cy="6858000"/>
   <p:notesSz cx="6858000" cy="9144000"/>
@@ -6147,6 +6150,126 @@
 </p:sld>
 </file>
 
+<file path=ppt/slides/slide10.xml><?xml version="1.0" encoding="utf-8"?>
+<p:sld xmlns:a="http://schemas.openxmlformats.org/drawingml/2006/main" xmlns:r="http://schemas.openxmlformats.org/officeDocument/2006/relationships" xmlns:p="http://schemas.openxmlformats.org/presentationml/2006/main">
+  <p:cSld>
+    <p:spTree>
+      <p:nvGrpSpPr>
+        <p:cNvPr id="1" name=""/>
+        <p:cNvGrpSpPr/>
+        <p:nvPr/>
+      </p:nvGrpSpPr>
+      <p:grpSpPr>
+        <a:xfrm>
+          <a:off x="0" y="0"/>
+          <a:ext cx="0" cy="0"/>
+          <a:chOff x="0" y="0"/>
+          <a:chExt cx="0" cy="0"/>
+        </a:xfrm>
+      </p:grpSpPr>
+      <p:sp>
+        <p:nvSpPr>
+          <p:cNvPr id="2" name="Title 1">
+            <a:extLst>
+              <a:ext uri="{FF2B5EF4-FFF2-40B4-BE49-F238E27FC236}">
+                <a16:creationId xmlns:a16="http://schemas.microsoft.com/office/drawing/2014/main" id="{08A4AA32-B158-4E92-8EA4-7406503CAAB0}"/>
+              </a:ext>
+            </a:extLst>
+          </p:cNvPr>
+          <p:cNvSpPr>
+            <a:spLocks noGrp="1"/>
+          </p:cNvSpPr>
+          <p:nvPr>
+            <p:ph type="title"/>
+          </p:nvPr>
+        </p:nvSpPr>
+        <p:spPr/>
+        <p:txBody>
+          <a:bodyPr/>
+          <a:lstStyle/>
+          <a:p>
+            <a:r>
+              <a:rPr lang="en-US" dirty="0"/>
+              <a:t>REFERENCES	</a:t>
+            </a:r>
+          </a:p>
+        </p:txBody>
+      </p:sp>
+      <p:sp>
+        <p:nvSpPr>
+          <p:cNvPr id="3" name="Content Placeholder 2">
+            <a:extLst>
+              <a:ext uri="{FF2B5EF4-FFF2-40B4-BE49-F238E27FC236}">
+                <a16:creationId xmlns:a16="http://schemas.microsoft.com/office/drawing/2014/main" id="{7718E719-3A24-4186-9392-48117C9B6A5F}"/>
+              </a:ext>
+            </a:extLst>
+          </p:cNvPr>
+          <p:cNvSpPr>
+            <a:spLocks noGrp="1"/>
+          </p:cNvSpPr>
+          <p:nvPr>
+            <p:ph idx="1"/>
+          </p:nvPr>
+        </p:nvSpPr>
+        <p:spPr/>
+        <p:txBody>
+          <a:bodyPr/>
+          <a:lstStyle/>
+          <a:p>
+            <a:pPr marL="0" indent="0">
+              <a:buNone/>
+            </a:pPr>
+            <a:r>
+              <a:rPr lang="en-US" dirty="0"/>
+              <a:t>What is Version Control? (n.d.). Retrieved July 7, 2018, from </a:t>
+            </a:r>
+            <a:r>
+              <a:rPr lang="en-US" dirty="0">
+                <a:hlinkClick r:id="rId2"/>
+              </a:rPr>
+              <a:t>https://www.git-</a:t>
+            </a:r>
+            <a:r>
+              <a:rPr lang="en-US" dirty="0"/>
+              <a:t>		tower.com/learn/git/videos/what-is-version-control</a:t>
+            </a:r>
+          </a:p>
+          <a:p>
+            <a:pPr marL="0" indent="0">
+              <a:buNone/>
+            </a:pPr>
+            <a:r>
+              <a:rPr lang="en-US" dirty="0"/>
+              <a:t>T. (2017, February 05). Git &amp; GitHub Crash Course For Beginners. Retrieved January 7, 2018, 	from https://www.youtube.com/watch?v=SWYqp7iY_Tc</a:t>
+            </a:r>
+          </a:p>
+          <a:p>
+            <a:pPr marL="0" indent="0">
+              <a:buNone/>
+            </a:pPr>
+            <a:r>
+              <a:rPr lang="en-US" dirty="0"/>
+              <a:t>How to get started with GIT and work with GIT Remote Repo. (n.d.). Retrieved January 7, 	2018, from https://www.ntu.edu.sg/home/ehchua/programming/howto/Git_HowTo.html</a:t>
+            </a:r>
+          </a:p>
+          <a:p>
+            <a:endParaRPr lang="en-US" dirty="0"/>
+          </a:p>
+        </p:txBody>
+      </p:sp>
+    </p:spTree>
+    <p:extLst>
+      <p:ext uri="{BB962C8B-B14F-4D97-AF65-F5344CB8AC3E}">
+        <p14:creationId xmlns:p14="http://schemas.microsoft.com/office/powerpoint/2010/main" val="4126193664"/>
+      </p:ext>
+    </p:extLst>
+  </p:cSld>
+  <p:clrMapOvr>
+    <a:masterClrMapping/>
+  </p:clrMapOvr>
+</p:sld>
+</file>
+
 <file path=ppt/slides/slide2.xml><?xml version="1.0" encoding="utf-8"?>
 <p:sld xmlns:a="http://schemas.openxmlformats.org/drawingml/2006/main" xmlns:r="http://schemas.openxmlformats.org/officeDocument/2006/relationships" xmlns:p="http://schemas.openxmlformats.org/presentationml/2006/main">
   <p:cSld>
@@ -8848,7 +8971,7 @@
                   <a:srgbClr val="FFFFFF"/>
                 </a:solidFill>
               </a:rPr>
-              <a:t>After a change is taken a “snapshot” is taken</a:t>
+              <a:t>After a change is made a “snapshot” is taken</a:t>
             </a:r>
           </a:p>
           <a:p>
@@ -8896,6 +9019,14 @@
 <file path=ppt/slides/slide5.xml><?xml version="1.0" encoding="utf-8"?>
 <p:sld xmlns:a="http://schemas.openxmlformats.org/drawingml/2006/main" xmlns:r="http://schemas.openxmlformats.org/officeDocument/2006/relationships" xmlns:p="http://schemas.openxmlformats.org/presentationml/2006/main">
   <p:cSld>
+    <p:bg>
+      <p:bgPr>
+        <a:solidFill>
+          <a:schemeClr val="bg1"/>
+        </a:solidFill>
+        <a:effectLst/>
+      </p:bgPr>
+    </p:bg>
     <p:spTree>
       <p:nvGrpSpPr>
         <p:cNvPr id="1" name=""/>
@@ -8910,12 +9041,1324 @@
           <a:chExt cx="0" cy="0"/>
         </a:xfrm>
       </p:grpSpPr>
+      <p:pic>
+        <p:nvPicPr>
+          <p:cNvPr id="10" name="Picture 9">
+            <a:extLst>
+              <a:ext uri="{FF2B5EF4-FFF2-40B4-BE49-F238E27FC236}">
+                <a16:creationId xmlns:a16="http://schemas.microsoft.com/office/drawing/2014/main" id="{41B68C77-138E-4BF7-A276-BD0C78A4219F}"/>
+              </a:ext>
+              <a:ext uri="{C183D7F6-B498-43B3-948B-1728B52AA6E4}">
+                <adec:decorative xmlns:adec="http://schemas.microsoft.com/office/drawing/2017/decorative" val="1"/>
+              </a:ext>
+            </a:extLst>
+          </p:cNvPr>
+          <p:cNvPicPr>
+            <a:picLocks noGrp="1" noRot="1" noChangeAspect="1" noMove="1" noResize="1" noEditPoints="1" noAdjustHandles="1" noChangeArrowheads="1" noChangeShapeType="1" noCrop="1"/>
+          </p:cNvPicPr>
+          <p:nvPr>
+            <p:extLst>
+              <p:ext uri="{386F3935-93C4-4BCD-93E2-E3B085C9AB24}">
+                <p16:designElem xmlns:p16="http://schemas.microsoft.com/office/powerpoint/2015/main" val="1"/>
+              </p:ext>
+            </p:extLst>
+          </p:nvPr>
+        </p:nvPicPr>
+        <p:blipFill rotWithShape="1">
+          <a:blip r:embed="rId2">
+            <a:extLst>
+              <a:ext uri="{28A0092B-C50C-407E-A947-70E740481C1C}">
+                <a14:useLocalDpi xmlns:a14="http://schemas.microsoft.com/office/drawing/2010/main" val="0"/>
+              </a:ext>
+            </a:extLst>
+          </a:blip>
+          <a:srcRect l="3613"/>
+          <a:stretch/>
+        </p:blipFill>
+        <p:spPr>
+          <a:xfrm>
+            <a:off x="0" y="2669685"/>
+            <a:ext cx="4037012" cy="4188315"/>
+          </a:xfrm>
+          <a:prstGeom prst="rect">
+            <a:avLst/>
+          </a:prstGeom>
+        </p:spPr>
+      </p:pic>
+      <p:pic>
+        <p:nvPicPr>
+          <p:cNvPr id="12" name="Picture 11">
+            <a:extLst>
+              <a:ext uri="{FF2B5EF4-FFF2-40B4-BE49-F238E27FC236}">
+                <a16:creationId xmlns:a16="http://schemas.microsoft.com/office/drawing/2014/main" id="{7C268552-D473-46ED-B1B8-422042C4DEF1}"/>
+              </a:ext>
+              <a:ext uri="{C183D7F6-B498-43B3-948B-1728B52AA6E4}">
+                <adec:decorative xmlns:adec="http://schemas.microsoft.com/office/drawing/2017/decorative" val="1"/>
+              </a:ext>
+            </a:extLst>
+          </p:cNvPr>
+          <p:cNvPicPr>
+            <a:picLocks noGrp="1" noRot="1" noChangeAspect="1" noMove="1" noResize="1" noEditPoints="1" noAdjustHandles="1" noChangeArrowheads="1" noChangeShapeType="1" noCrop="1"/>
+          </p:cNvPicPr>
+          <p:nvPr>
+            <p:extLst>
+              <p:ext uri="{386F3935-93C4-4BCD-93E2-E3B085C9AB24}">
+                <p16:designElem xmlns:p16="http://schemas.microsoft.com/office/powerpoint/2015/main" val="1"/>
+              </p:ext>
+            </p:extLst>
+          </p:nvPr>
+        </p:nvPicPr>
+        <p:blipFill rotWithShape="1">
+          <a:blip r:embed="rId3">
+            <a:extLst>
+              <a:ext uri="{28A0092B-C50C-407E-A947-70E740481C1C}">
+                <a14:useLocalDpi xmlns:a14="http://schemas.microsoft.com/office/drawing/2010/main" val="0"/>
+              </a:ext>
+            </a:extLst>
+          </a:blip>
+          <a:srcRect l="35640"/>
+          <a:stretch/>
+        </p:blipFill>
+        <p:spPr>
+          <a:xfrm>
+            <a:off x="0" y="2892347"/>
+            <a:ext cx="1522412" cy="2365453"/>
+          </a:xfrm>
+          <a:prstGeom prst="rect">
+            <a:avLst/>
+          </a:prstGeom>
+        </p:spPr>
+      </p:pic>
+      <p:sp>
+        <p:nvSpPr>
+          <p:cNvPr id="14" name="Oval 13">
+            <a:extLst>
+              <a:ext uri="{FF2B5EF4-FFF2-40B4-BE49-F238E27FC236}">
+                <a16:creationId xmlns:a16="http://schemas.microsoft.com/office/drawing/2014/main" id="{4AC0CD9D-7610-4620-93B4-798CCD9AB581}"/>
+              </a:ext>
+              <a:ext uri="{C183D7F6-B498-43B3-948B-1728B52AA6E4}">
+                <adec:decorative xmlns:adec="http://schemas.microsoft.com/office/drawing/2017/decorative" val="1"/>
+              </a:ext>
+            </a:extLst>
+          </p:cNvPr>
+          <p:cNvSpPr>
+            <a:spLocks noGrp="1" noRot="1" noChangeAspect="1" noMove="1" noResize="1" noEditPoints="1" noAdjustHandles="1" noChangeArrowheads="1" noChangeShapeType="1" noTextEdit="1"/>
+          </p:cNvSpPr>
+          <p:nvPr>
+            <p:extLst>
+              <p:ext uri="{386F3935-93C4-4BCD-93E2-E3B085C9AB24}">
+                <p16:designElem xmlns:p16="http://schemas.microsoft.com/office/powerpoint/2015/main" val="1"/>
+              </p:ext>
+            </p:extLst>
+          </p:nvPr>
+        </p:nvSpPr>
+        <p:spPr>
+          <a:xfrm>
+            <a:off x="8609012" y="1676400"/>
+            <a:ext cx="2819400" cy="2819400"/>
+          </a:xfrm>
+          <a:prstGeom prst="ellipse">
+            <a:avLst/>
+          </a:prstGeom>
+          <a:gradFill flip="none" rotWithShape="1">
+            <a:gsLst>
+              <a:gs pos="0">
+                <a:schemeClr val="bg2">
+                  <a:lumMod val="60000"/>
+                  <a:lumOff val="40000"/>
+                  <a:alpha val="7000"/>
+                </a:schemeClr>
+              </a:gs>
+              <a:gs pos="69000">
+                <a:schemeClr val="bg2">
+                  <a:lumMod val="60000"/>
+                  <a:lumOff val="40000"/>
+                  <a:alpha val="0"/>
+                </a:schemeClr>
+              </a:gs>
+              <a:gs pos="36000">
+                <a:schemeClr val="bg2">
+                  <a:lumMod val="60000"/>
+                  <a:lumOff val="40000"/>
+                  <a:alpha val="6000"/>
+                </a:schemeClr>
+              </a:gs>
+            </a:gsLst>
+            <a:path path="circle">
+              <a:fillToRect l="50000" t="50000" r="50000" b="50000"/>
+            </a:path>
+            <a:tileRect/>
+          </a:gradFill>
+          <a:ln>
+            <a:noFill/>
+          </a:ln>
+          <a:effectLst/>
+        </p:spPr>
+        <p:style>
+          <a:lnRef idx="1">
+            <a:schemeClr val="accent1"/>
+          </a:lnRef>
+          <a:fillRef idx="3">
+            <a:schemeClr val="accent1"/>
+          </a:fillRef>
+          <a:effectRef idx="2">
+            <a:schemeClr val="accent1"/>
+          </a:effectRef>
+          <a:fontRef idx="minor">
+            <a:schemeClr val="lt1"/>
+          </a:fontRef>
+        </p:style>
+      </p:sp>
+      <p:pic>
+        <p:nvPicPr>
+          <p:cNvPr id="16" name="Picture 15">
+            <a:extLst>
+              <a:ext uri="{FF2B5EF4-FFF2-40B4-BE49-F238E27FC236}">
+                <a16:creationId xmlns:a16="http://schemas.microsoft.com/office/drawing/2014/main" id="{B9238B3E-24AA-439A-B527-6C5DF6D72145}"/>
+              </a:ext>
+              <a:ext uri="{C183D7F6-B498-43B3-948B-1728B52AA6E4}">
+                <adec:decorative xmlns:adec="http://schemas.microsoft.com/office/drawing/2017/decorative" val="1"/>
+              </a:ext>
+            </a:extLst>
+          </p:cNvPr>
+          <p:cNvPicPr>
+            <a:picLocks noGrp="1" noRot="1" noChangeAspect="1" noMove="1" noResize="1" noEditPoints="1" noAdjustHandles="1" noChangeArrowheads="1" noChangeShapeType="1" noCrop="1"/>
+          </p:cNvPicPr>
+          <p:nvPr>
+            <p:extLst>
+              <p:ext uri="{386F3935-93C4-4BCD-93E2-E3B085C9AB24}">
+                <p16:designElem xmlns:p16="http://schemas.microsoft.com/office/powerpoint/2015/main" val="1"/>
+              </p:ext>
+            </p:extLst>
+          </p:nvPr>
+        </p:nvPicPr>
+        <p:blipFill rotWithShape="1">
+          <a:blip r:embed="rId4">
+            <a:extLst>
+              <a:ext uri="{28A0092B-C50C-407E-A947-70E740481C1C}">
+                <a14:useLocalDpi xmlns:a14="http://schemas.microsoft.com/office/drawing/2010/main" val="0"/>
+              </a:ext>
+            </a:extLst>
+          </a:blip>
+          <a:srcRect t="28813"/>
+          <a:stretch/>
+        </p:blipFill>
+        <p:spPr>
+          <a:xfrm>
+            <a:off x="7999412" y="0"/>
+            <a:ext cx="1603387" cy="1141407"/>
+          </a:xfrm>
+          <a:prstGeom prst="rect">
+            <a:avLst/>
+          </a:prstGeom>
+        </p:spPr>
+      </p:pic>
+      <p:pic>
+        <p:nvPicPr>
+          <p:cNvPr id="18" name="Picture 17">
+            <a:extLst>
+              <a:ext uri="{FF2B5EF4-FFF2-40B4-BE49-F238E27FC236}">
+                <a16:creationId xmlns:a16="http://schemas.microsoft.com/office/drawing/2014/main" id="{69F01145-BEA3-4CBF-AA21-10077B948CA8}"/>
+              </a:ext>
+              <a:ext uri="{C183D7F6-B498-43B3-948B-1728B52AA6E4}">
+                <adec:decorative xmlns:adec="http://schemas.microsoft.com/office/drawing/2017/decorative" val="1"/>
+              </a:ext>
+            </a:extLst>
+          </p:cNvPr>
+          <p:cNvPicPr>
+            <a:picLocks noGrp="1" noRot="1" noChangeAspect="1" noMove="1" noResize="1" noEditPoints="1" noAdjustHandles="1" noChangeArrowheads="1" noChangeShapeType="1" noCrop="1"/>
+          </p:cNvPicPr>
+          <p:nvPr>
+            <p:extLst>
+              <p:ext uri="{386F3935-93C4-4BCD-93E2-E3B085C9AB24}">
+                <p16:designElem xmlns:p16="http://schemas.microsoft.com/office/powerpoint/2015/main" val="1"/>
+              </p:ext>
+            </p:extLst>
+          </p:nvPr>
+        </p:nvPicPr>
+        <p:blipFill rotWithShape="1">
+          <a:blip r:embed="rId5">
+            <a:extLst>
+              <a:ext uri="{28A0092B-C50C-407E-A947-70E740481C1C}">
+                <a14:useLocalDpi xmlns:a14="http://schemas.microsoft.com/office/drawing/2010/main" val="0"/>
+              </a:ext>
+            </a:extLst>
+          </a:blip>
+          <a:srcRect b="23320"/>
+          <a:stretch/>
+        </p:blipFill>
+        <p:spPr>
+          <a:xfrm>
+            <a:off x="8605878" y="6096000"/>
+            <a:ext cx="993734" cy="762000"/>
+          </a:xfrm>
+          <a:prstGeom prst="rect">
+            <a:avLst/>
+          </a:prstGeom>
+        </p:spPr>
+      </p:pic>
+      <p:sp>
+        <p:nvSpPr>
+          <p:cNvPr id="20" name="Rectangle 19">
+            <a:extLst>
+              <a:ext uri="{FF2B5EF4-FFF2-40B4-BE49-F238E27FC236}">
+                <a16:creationId xmlns:a16="http://schemas.microsoft.com/office/drawing/2014/main" id="{DE4D62F9-188E-4530-84C2-24BDEE4BEB82}"/>
+              </a:ext>
+              <a:ext uri="{C183D7F6-B498-43B3-948B-1728B52AA6E4}">
+                <adec:decorative xmlns:adec="http://schemas.microsoft.com/office/drawing/2017/decorative" val="1"/>
+              </a:ext>
+            </a:extLst>
+          </p:cNvPr>
+          <p:cNvSpPr>
+            <a:spLocks noGrp="1" noRot="1" noChangeAspect="1" noMove="1" noResize="1" noEditPoints="1" noAdjustHandles="1" noChangeArrowheads="1" noChangeShapeType="1" noTextEdit="1"/>
+          </p:cNvSpPr>
+          <p:nvPr>
+            <p:extLst>
+              <p:ext uri="{386F3935-93C4-4BCD-93E2-E3B085C9AB24}">
+                <p16:designElem xmlns:p16="http://schemas.microsoft.com/office/powerpoint/2015/main" val="1"/>
+              </p:ext>
+            </p:extLst>
+          </p:nvPr>
+        </p:nvSpPr>
+        <p:spPr>
+          <a:xfrm>
+            <a:off x="10437812" y="0"/>
+            <a:ext cx="685800" cy="1143000"/>
+          </a:xfrm>
+          <a:prstGeom prst="rect">
+            <a:avLst/>
+          </a:prstGeom>
+          <a:solidFill>
+            <a:schemeClr val="accent1"/>
+          </a:solidFill>
+          <a:ln>
+            <a:noFill/>
+          </a:ln>
+        </p:spPr>
+        <p:style>
+          <a:lnRef idx="1">
+            <a:schemeClr val="accent1"/>
+          </a:lnRef>
+          <a:fillRef idx="3">
+            <a:schemeClr val="accent1"/>
+          </a:fillRef>
+          <a:effectRef idx="2">
+            <a:schemeClr val="accent1"/>
+          </a:effectRef>
+          <a:fontRef idx="minor">
+            <a:schemeClr val="lt1"/>
+          </a:fontRef>
+        </p:style>
+      </p:sp>
+      <p:sp>
+        <p:nvSpPr>
+          <p:cNvPr id="22" name="Rectangle 21">
+            <a:extLst>
+              <a:ext uri="{FF2B5EF4-FFF2-40B4-BE49-F238E27FC236}">
+                <a16:creationId xmlns:a16="http://schemas.microsoft.com/office/drawing/2014/main" id="{5F3FC718-FDE3-4EF7-921E-A5F374EAF824}"/>
+              </a:ext>
+              <a:ext uri="{C183D7F6-B498-43B3-948B-1728B52AA6E4}">
+                <adec:decorative xmlns:adec="http://schemas.microsoft.com/office/drawing/2017/decorative" val="1"/>
+              </a:ext>
+            </a:extLst>
+          </p:cNvPr>
+          <p:cNvSpPr>
+            <a:spLocks noGrp="1" noRot="1" noChangeAspect="1" noMove="1" noResize="1" noEditPoints="1" noAdjustHandles="1" noChangeArrowheads="1" noChangeShapeType="1" noTextEdit="1"/>
+          </p:cNvSpPr>
+          <p:nvPr>
+            <p:extLst>
+              <p:ext uri="{386F3935-93C4-4BCD-93E2-E3B085C9AB24}">
+                <p16:designElem xmlns:p16="http://schemas.microsoft.com/office/powerpoint/2015/main" val="1"/>
+              </p:ext>
+            </p:extLst>
+          </p:nvPr>
+        </p:nvSpPr>
+        <p:spPr>
+          <a:xfrm>
+            <a:off x="0" y="0"/>
+            <a:ext cx="12192000" cy="6858000"/>
+          </a:xfrm>
+          <a:prstGeom prst="rect">
+            <a:avLst/>
+          </a:prstGeom>
+          <a:ln>
+            <a:noFill/>
+          </a:ln>
+        </p:spPr>
+        <p:style>
+          <a:lnRef idx="2">
+            <a:schemeClr val="accent1">
+              <a:shade val="50000"/>
+            </a:schemeClr>
+          </a:lnRef>
+          <a:fillRef idx="1003">
+            <a:schemeClr val="dk2"/>
+          </a:fillRef>
+          <a:effectRef idx="0">
+            <a:schemeClr val="accent1"/>
+          </a:effectRef>
+          <a:fontRef idx="minor">
+            <a:schemeClr val="lt1"/>
+          </a:fontRef>
+        </p:style>
+        <p:txBody>
+          <a:bodyPr rtlCol="0" anchor="ctr"/>
+          <a:lstStyle/>
+          <a:p>
+            <a:pPr algn="ctr"/>
+            <a:endParaRPr lang="en-US"/>
+          </a:p>
+        </p:txBody>
+      </p:sp>
+      <p:sp>
+        <p:nvSpPr>
+          <p:cNvPr id="24" name="Freeform 11">
+            <a:extLst>
+              <a:ext uri="{FF2B5EF4-FFF2-40B4-BE49-F238E27FC236}">
+                <a16:creationId xmlns:a16="http://schemas.microsoft.com/office/drawing/2014/main" id="{FAA0F719-3DC8-4F08-AD8F-5A845658CB9D}"/>
+              </a:ext>
+              <a:ext uri="{C183D7F6-B498-43B3-948B-1728B52AA6E4}">
+                <adec:decorative xmlns:adec="http://schemas.microsoft.com/office/drawing/2017/decorative" val="1"/>
+              </a:ext>
+            </a:extLst>
+          </p:cNvPr>
+          <p:cNvSpPr>
+            <a:spLocks noGrp="1" noRot="1" noChangeAspect="1" noMove="1" noResize="1" noEditPoints="1" noAdjustHandles="1" noChangeArrowheads="1" noChangeShapeType="1" noTextEdit="1"/>
+          </p:cNvSpPr>
+          <p:nvPr>
+            <p:extLst>
+              <p:ext uri="{386F3935-93C4-4BCD-93E2-E3B085C9AB24}">
+                <p16:designElem xmlns:p16="http://schemas.microsoft.com/office/powerpoint/2015/main" val="1"/>
+              </p:ext>
+            </p:extLst>
+          </p:nvPr>
+        </p:nvSpPr>
+        <p:spPr>
+          <a:xfrm>
+            <a:off x="3948110" y="-1"/>
+            <a:ext cx="559472" cy="3709642"/>
+          </a:xfrm>
+          <a:custGeom>
+            <a:avLst/>
+            <a:gdLst>
+              <a:gd name="connsiteX0" fmla="*/ 0 w 559472"/>
+              <a:gd name="connsiteY0" fmla="*/ 0 h 3709642"/>
+              <a:gd name="connsiteX1" fmla="*/ 473952 w 559472"/>
+              <a:gd name="connsiteY1" fmla="*/ 0 h 3709642"/>
+              <a:gd name="connsiteX2" fmla="*/ 485840 w 559472"/>
+              <a:gd name="connsiteY2" fmla="*/ 161194 h 3709642"/>
+              <a:gd name="connsiteX3" fmla="*/ 523949 w 559472"/>
+              <a:gd name="connsiteY3" fmla="*/ 3672197 h 3709642"/>
+              <a:gd name="connsiteX4" fmla="*/ 454748 w 559472"/>
+              <a:gd name="connsiteY4" fmla="*/ 3709642 h 3709642"/>
+              <a:gd name="connsiteX5" fmla="*/ 448224 w 559472"/>
+              <a:gd name="connsiteY5" fmla="*/ 3510471 h 3709642"/>
+              <a:gd name="connsiteX6" fmla="*/ 443564 w 559472"/>
+              <a:gd name="connsiteY6" fmla="*/ 3408563 h 3709642"/>
+              <a:gd name="connsiteX7" fmla="*/ 438902 w 559472"/>
+              <a:gd name="connsiteY7" fmla="*/ 3304407 h 3709642"/>
+              <a:gd name="connsiteX8" fmla="*/ 433941 w 559472"/>
+              <a:gd name="connsiteY8" fmla="*/ 3198777 h 3709642"/>
+              <a:gd name="connsiteX9" fmla="*/ 427584 w 559472"/>
+              <a:gd name="connsiteY9" fmla="*/ 3092510 h 3709642"/>
+              <a:gd name="connsiteX10" fmla="*/ 420988 w 559472"/>
+              <a:gd name="connsiteY10" fmla="*/ 2984390 h 3709642"/>
+              <a:gd name="connsiteX11" fmla="*/ 414330 w 559472"/>
+              <a:gd name="connsiteY11" fmla="*/ 2874401 h 3709642"/>
+              <a:gd name="connsiteX12" fmla="*/ 406840 w 559472"/>
+              <a:gd name="connsiteY12" fmla="*/ 2762980 h 3709642"/>
+              <a:gd name="connsiteX13" fmla="*/ 397745 w 559472"/>
+              <a:gd name="connsiteY13" fmla="*/ 2650566 h 3709642"/>
+              <a:gd name="connsiteX14" fmla="*/ 389154 w 559472"/>
+              <a:gd name="connsiteY14" fmla="*/ 2536612 h 3709642"/>
+              <a:gd name="connsiteX15" fmla="*/ 379225 w 559472"/>
+              <a:gd name="connsiteY15" fmla="*/ 2421642 h 3709642"/>
+              <a:gd name="connsiteX16" fmla="*/ 368316 w 559472"/>
+              <a:gd name="connsiteY16" fmla="*/ 2305627 h 3709642"/>
+              <a:gd name="connsiteX17" fmla="*/ 357466 w 559472"/>
+              <a:gd name="connsiteY17" fmla="*/ 2189233 h 3709642"/>
+              <a:gd name="connsiteX18" fmla="*/ 344982 w 559472"/>
+              <a:gd name="connsiteY18" fmla="*/ 2071473 h 3709642"/>
+              <a:gd name="connsiteX19" fmla="*/ 332466 w 559472"/>
+              <a:gd name="connsiteY19" fmla="*/ 1952216 h 3709642"/>
+              <a:gd name="connsiteX20" fmla="*/ 319121 w 559472"/>
+              <a:gd name="connsiteY20" fmla="*/ 1833776 h 3709642"/>
+              <a:gd name="connsiteX21" fmla="*/ 304408 w 559472"/>
+              <a:gd name="connsiteY21" fmla="*/ 1713948 h 3709642"/>
+              <a:gd name="connsiteX22" fmla="*/ 288685 w 559472"/>
+              <a:gd name="connsiteY22" fmla="*/ 1592703 h 3709642"/>
+              <a:gd name="connsiteX23" fmla="*/ 273050 w 559472"/>
+              <a:gd name="connsiteY23" fmla="*/ 1471451 h 3709642"/>
+              <a:gd name="connsiteX24" fmla="*/ 255813 w 559472"/>
+              <a:gd name="connsiteY24" fmla="*/ 1350328 h 3709642"/>
+              <a:gd name="connsiteX25" fmla="*/ 237060 w 559472"/>
+              <a:gd name="connsiteY25" fmla="*/ 1227080 h 3709642"/>
+              <a:gd name="connsiteX26" fmla="*/ 218488 w 559472"/>
+              <a:gd name="connsiteY26" fmla="*/ 1106065 h 3709642"/>
+              <a:gd name="connsiteX27" fmla="*/ 198221 w 559472"/>
+              <a:gd name="connsiteY27" fmla="*/ 982940 h 3709642"/>
+              <a:gd name="connsiteX28" fmla="*/ 177152 w 559472"/>
+              <a:gd name="connsiteY28" fmla="*/ 858755 h 3709642"/>
+              <a:gd name="connsiteX29" fmla="*/ 155551 w 559472"/>
+              <a:gd name="connsiteY29" fmla="*/ 736861 h 3709642"/>
+              <a:gd name="connsiteX30" fmla="*/ 131782 w 559472"/>
+              <a:gd name="connsiteY30" fmla="*/ 613645 h 3709642"/>
+              <a:gd name="connsiteX31" fmla="*/ 107123 w 559472"/>
+              <a:gd name="connsiteY31" fmla="*/ 490500 h 3709642"/>
+              <a:gd name="connsiteX32" fmla="*/ 82552 w 559472"/>
+              <a:gd name="connsiteY32" fmla="*/ 367348 h 3709642"/>
+              <a:gd name="connsiteX33" fmla="*/ 55608 w 559472"/>
+              <a:gd name="connsiteY33" fmla="*/ 244762 h 3709642"/>
+              <a:gd name="connsiteX34" fmla="*/ 28130 w 559472"/>
+              <a:gd name="connsiteY34" fmla="*/ 122220 h 3709642"/>
+              <a:gd name="connsiteX35" fmla="*/ 0 w 559472"/>
+              <a:gd name="connsiteY35" fmla="*/ 0 h 3709642"/>
+            </a:gdLst>
+            <a:ahLst/>
+            <a:cxnLst>
+              <a:cxn ang="0">
+                <a:pos x="connsiteX0" y="connsiteY0"/>
+              </a:cxn>
+              <a:cxn ang="0">
+                <a:pos x="connsiteX1" y="connsiteY1"/>
+              </a:cxn>
+              <a:cxn ang="0">
+                <a:pos x="connsiteX2" y="connsiteY2"/>
+              </a:cxn>
+              <a:cxn ang="0">
+                <a:pos x="connsiteX3" y="connsiteY3"/>
+              </a:cxn>
+              <a:cxn ang="0">
+                <a:pos x="connsiteX4" y="connsiteY4"/>
+              </a:cxn>
+              <a:cxn ang="0">
+                <a:pos x="connsiteX5" y="connsiteY5"/>
+              </a:cxn>
+              <a:cxn ang="0">
+                <a:pos x="connsiteX6" y="connsiteY6"/>
+              </a:cxn>
+              <a:cxn ang="0">
+                <a:pos x="connsiteX7" y="connsiteY7"/>
+              </a:cxn>
+              <a:cxn ang="0">
+                <a:pos x="connsiteX8" y="connsiteY8"/>
+              </a:cxn>
+              <a:cxn ang="0">
+                <a:pos x="connsiteX9" y="connsiteY9"/>
+              </a:cxn>
+              <a:cxn ang="0">
+                <a:pos x="connsiteX10" y="connsiteY10"/>
+              </a:cxn>
+              <a:cxn ang="0">
+                <a:pos x="connsiteX11" y="connsiteY11"/>
+              </a:cxn>
+              <a:cxn ang="0">
+                <a:pos x="connsiteX12" y="connsiteY12"/>
+              </a:cxn>
+              <a:cxn ang="0">
+                <a:pos x="connsiteX13" y="connsiteY13"/>
+              </a:cxn>
+              <a:cxn ang="0">
+                <a:pos x="connsiteX14" y="connsiteY14"/>
+              </a:cxn>
+              <a:cxn ang="0">
+                <a:pos x="connsiteX15" y="connsiteY15"/>
+              </a:cxn>
+              <a:cxn ang="0">
+                <a:pos x="connsiteX16" y="connsiteY16"/>
+              </a:cxn>
+              <a:cxn ang="0">
+                <a:pos x="connsiteX17" y="connsiteY17"/>
+              </a:cxn>
+              <a:cxn ang="0">
+                <a:pos x="connsiteX18" y="connsiteY18"/>
+              </a:cxn>
+              <a:cxn ang="0">
+                <a:pos x="connsiteX19" y="connsiteY19"/>
+              </a:cxn>
+              <a:cxn ang="0">
+                <a:pos x="connsiteX20" y="connsiteY20"/>
+              </a:cxn>
+              <a:cxn ang="0">
+                <a:pos x="connsiteX21" y="connsiteY21"/>
+              </a:cxn>
+              <a:cxn ang="0">
+                <a:pos x="connsiteX22" y="connsiteY22"/>
+              </a:cxn>
+              <a:cxn ang="0">
+                <a:pos x="connsiteX23" y="connsiteY23"/>
+              </a:cxn>
+              <a:cxn ang="0">
+                <a:pos x="connsiteX24" y="connsiteY24"/>
+              </a:cxn>
+              <a:cxn ang="0">
+                <a:pos x="connsiteX25" y="connsiteY25"/>
+              </a:cxn>
+              <a:cxn ang="0">
+                <a:pos x="connsiteX26" y="connsiteY26"/>
+              </a:cxn>
+              <a:cxn ang="0">
+                <a:pos x="connsiteX27" y="connsiteY27"/>
+              </a:cxn>
+              <a:cxn ang="0">
+                <a:pos x="connsiteX28" y="connsiteY28"/>
+              </a:cxn>
+              <a:cxn ang="0">
+                <a:pos x="connsiteX29" y="connsiteY29"/>
+              </a:cxn>
+              <a:cxn ang="0">
+                <a:pos x="connsiteX30" y="connsiteY30"/>
+              </a:cxn>
+              <a:cxn ang="0">
+                <a:pos x="connsiteX31" y="connsiteY31"/>
+              </a:cxn>
+              <a:cxn ang="0">
+                <a:pos x="connsiteX32" y="connsiteY32"/>
+              </a:cxn>
+              <a:cxn ang="0">
+                <a:pos x="connsiteX33" y="connsiteY33"/>
+              </a:cxn>
+              <a:cxn ang="0">
+                <a:pos x="connsiteX34" y="connsiteY34"/>
+              </a:cxn>
+              <a:cxn ang="0">
+                <a:pos x="connsiteX35" y="connsiteY35"/>
+              </a:cxn>
+            </a:cxnLst>
+            <a:rect l="l" t="t" r="r" b="b"/>
+            <a:pathLst>
+              <a:path w="559472" h="3709642">
+                <a:moveTo>
+                  <a:pt x="0" y="0"/>
+                </a:moveTo>
+                <a:lnTo>
+                  <a:pt x="473952" y="0"/>
+                </a:lnTo>
+                <a:lnTo>
+                  <a:pt x="485840" y="161194"/>
+                </a:lnTo>
+                <a:cubicBezTo>
+                  <a:pt x="552063" y="1147770"/>
+                  <a:pt x="592441" y="3086737"/>
+                  <a:pt x="523949" y="3672197"/>
+                </a:cubicBezTo>
+                <a:cubicBezTo>
+                  <a:pt x="500842" y="3684557"/>
+                  <a:pt x="477855" y="3697282"/>
+                  <a:pt x="454748" y="3709642"/>
+                </a:cubicBezTo>
+                <a:lnTo>
+                  <a:pt x="448224" y="3510471"/>
+                </a:lnTo>
+                <a:lnTo>
+                  <a:pt x="443564" y="3408563"/>
+                </a:lnTo>
+                <a:lnTo>
+                  <a:pt x="438902" y="3304407"/>
+                </a:lnTo>
+                <a:lnTo>
+                  <a:pt x="433941" y="3198777"/>
+                </a:lnTo>
+                <a:lnTo>
+                  <a:pt x="427584" y="3092510"/>
+                </a:lnTo>
+                <a:lnTo>
+                  <a:pt x="420988" y="2984390"/>
+                </a:lnTo>
+                <a:lnTo>
+                  <a:pt x="414330" y="2874401"/>
+                </a:lnTo>
+                <a:lnTo>
+                  <a:pt x="406840" y="2762980"/>
+                </a:lnTo>
+                <a:lnTo>
+                  <a:pt x="397745" y="2650566"/>
+                </a:lnTo>
+                <a:lnTo>
+                  <a:pt x="389154" y="2536612"/>
+                </a:lnTo>
+                <a:lnTo>
+                  <a:pt x="379225" y="2421642"/>
+                </a:lnTo>
+                <a:lnTo>
+                  <a:pt x="368316" y="2305627"/>
+                </a:lnTo>
+                <a:lnTo>
+                  <a:pt x="357466" y="2189233"/>
+                </a:lnTo>
+                <a:lnTo>
+                  <a:pt x="344982" y="2071473"/>
+                </a:lnTo>
+                <a:lnTo>
+                  <a:pt x="332466" y="1952216"/>
+                </a:lnTo>
+                <a:lnTo>
+                  <a:pt x="319121" y="1833776"/>
+                </a:lnTo>
+                <a:lnTo>
+                  <a:pt x="304408" y="1713948"/>
+                </a:lnTo>
+                <a:lnTo>
+                  <a:pt x="288685" y="1592703"/>
+                </a:lnTo>
+                <a:lnTo>
+                  <a:pt x="273050" y="1471451"/>
+                </a:lnTo>
+                <a:lnTo>
+                  <a:pt x="255813" y="1350328"/>
+                </a:lnTo>
+                <a:lnTo>
+                  <a:pt x="237060" y="1227080"/>
+                </a:lnTo>
+                <a:lnTo>
+                  <a:pt x="218488" y="1106065"/>
+                </a:lnTo>
+                <a:lnTo>
+                  <a:pt x="198221" y="982940"/>
+                </a:lnTo>
+                <a:lnTo>
+                  <a:pt x="177152" y="858755"/>
+                </a:lnTo>
+                <a:lnTo>
+                  <a:pt x="155551" y="736861"/>
+                </a:lnTo>
+                <a:lnTo>
+                  <a:pt x="131782" y="613645"/>
+                </a:lnTo>
+                <a:lnTo>
+                  <a:pt x="107123" y="490500"/>
+                </a:lnTo>
+                <a:lnTo>
+                  <a:pt x="82552" y="367348"/>
+                </a:lnTo>
+                <a:lnTo>
+                  <a:pt x="55608" y="244762"/>
+                </a:lnTo>
+                <a:lnTo>
+                  <a:pt x="28130" y="122220"/>
+                </a:lnTo>
+                <a:lnTo>
+                  <a:pt x="0" y="0"/>
+                </a:lnTo>
+                <a:close/>
+              </a:path>
+            </a:pathLst>
+          </a:custGeom>
+          <a:solidFill>
+            <a:schemeClr val="bg1">
+              <a:alpha val="20000"/>
+            </a:schemeClr>
+          </a:solidFill>
+          <a:ln>
+            <a:noFill/>
+          </a:ln>
+        </p:spPr>
+        <p:txBody>
+          <a:bodyPr rtlCol="0" anchor="ctr"/>
+          <a:lstStyle/>
+          <a:p>
+            <a:pPr algn="ctr"/>
+            <a:endParaRPr lang="en-US"/>
+          </a:p>
+        </p:txBody>
+      </p:sp>
+      <p:sp useBgFill="1">
+        <p:nvSpPr>
+          <p:cNvPr id="26" name="Freeform: Shape 25">
+            <a:extLst>
+              <a:ext uri="{FF2B5EF4-FFF2-40B4-BE49-F238E27FC236}">
+                <a16:creationId xmlns:a16="http://schemas.microsoft.com/office/drawing/2014/main" id="{7DCB61BE-FA0F-4EFB-BE0E-268BAD8E30D6}"/>
+              </a:ext>
+              <a:ext uri="{C183D7F6-B498-43B3-948B-1728B52AA6E4}">
+                <adec:decorative xmlns:adec="http://schemas.microsoft.com/office/drawing/2017/decorative" val="1"/>
+              </a:ext>
+            </a:extLst>
+          </p:cNvPr>
+          <p:cNvSpPr>
+            <a:spLocks noGrp="1" noRot="1" noChangeAspect="1" noMove="1" noResize="1" noEditPoints="1" noAdjustHandles="1" noChangeArrowheads="1" noChangeShapeType="1" noTextEdit="1"/>
+          </p:cNvSpPr>
+          <p:nvPr>
+            <p:extLst>
+              <p:ext uri="{386F3935-93C4-4BCD-93E2-E3B085C9AB24}">
+                <p16:designElem xmlns:p16="http://schemas.microsoft.com/office/powerpoint/2015/main" val="1"/>
+              </p:ext>
+            </p:extLst>
+          </p:nvPr>
+        </p:nvSpPr>
+        <p:spPr bwMode="gray">
+          <a:xfrm rot="16200000">
+            <a:off x="4747655" y="-586345"/>
+            <a:ext cx="6858001" cy="8030691"/>
+          </a:xfrm>
+          <a:custGeom>
+            <a:avLst/>
+            <a:gdLst>
+              <a:gd name="connsiteX0" fmla="*/ 6858001 w 6858001"/>
+              <a:gd name="connsiteY0" fmla="*/ 1177 h 8030691"/>
+              <a:gd name="connsiteX1" fmla="*/ 6858001 w 6858001"/>
+              <a:gd name="connsiteY1" fmla="*/ 1344715 h 8030691"/>
+              <a:gd name="connsiteX2" fmla="*/ 6858000 w 6858001"/>
+              <a:gd name="connsiteY2" fmla="*/ 1344715 h 8030691"/>
+              <a:gd name="connsiteX3" fmla="*/ 6858000 w 6858001"/>
+              <a:gd name="connsiteY3" fmla="*/ 8030691 h 8030691"/>
+              <a:gd name="connsiteX4" fmla="*/ 0 w 6858001"/>
+              <a:gd name="connsiteY4" fmla="*/ 8030690 h 8030691"/>
+              <a:gd name="connsiteX5" fmla="*/ 0 w 6858001"/>
+              <a:gd name="connsiteY5" fmla="*/ 477747 h 8030691"/>
+              <a:gd name="connsiteX6" fmla="*/ 1 w 6858001"/>
+              <a:gd name="connsiteY6" fmla="*/ 477747 h 8030691"/>
+              <a:gd name="connsiteX7" fmla="*/ 1 w 6858001"/>
+              <a:gd name="connsiteY7" fmla="*/ 0 h 8030691"/>
+              <a:gd name="connsiteX8" fmla="*/ 40463 w 6858001"/>
+              <a:gd name="connsiteY8" fmla="*/ 5883 h 8030691"/>
+              <a:gd name="connsiteX9" fmla="*/ 159107 w 6858001"/>
+              <a:gd name="connsiteY9" fmla="*/ 23196 h 8030691"/>
+              <a:gd name="connsiteX10" fmla="*/ 245518 w 6858001"/>
+              <a:gd name="connsiteY10" fmla="*/ 35299 h 8030691"/>
+              <a:gd name="connsiteX11" fmla="*/ 348388 w 6858001"/>
+              <a:gd name="connsiteY11" fmla="*/ 48074 h 8030691"/>
+              <a:gd name="connsiteX12" fmla="*/ 470460 w 6858001"/>
+              <a:gd name="connsiteY12" fmla="*/ 63370 h 8030691"/>
+              <a:gd name="connsiteX13" fmla="*/ 605563 w 6858001"/>
+              <a:gd name="connsiteY13" fmla="*/ 79507 h 8030691"/>
+              <a:gd name="connsiteX14" fmla="*/ 757810 w 6858001"/>
+              <a:gd name="connsiteY14" fmla="*/ 96484 h 8030691"/>
+              <a:gd name="connsiteX15" fmla="*/ 923774 w 6858001"/>
+              <a:gd name="connsiteY15" fmla="*/ 114469 h 8030691"/>
+              <a:gd name="connsiteX16" fmla="*/ 1104139 w 6858001"/>
+              <a:gd name="connsiteY16" fmla="*/ 132455 h 8030691"/>
+              <a:gd name="connsiteX17" fmla="*/ 1296163 w 6858001"/>
+              <a:gd name="connsiteY17" fmla="*/ 150776 h 8030691"/>
+              <a:gd name="connsiteX18" fmla="*/ 1503275 w 6858001"/>
+              <a:gd name="connsiteY18" fmla="*/ 167753 h 8030691"/>
+              <a:gd name="connsiteX19" fmla="*/ 1719988 w 6858001"/>
+              <a:gd name="connsiteY19" fmla="*/ 184058 h 8030691"/>
+              <a:gd name="connsiteX20" fmla="*/ 1949045 w 6858001"/>
+              <a:gd name="connsiteY20" fmla="*/ 198850 h 8030691"/>
+              <a:gd name="connsiteX21" fmla="*/ 2187703 w 6858001"/>
+              <a:gd name="connsiteY21" fmla="*/ 212969 h 8030691"/>
+              <a:gd name="connsiteX22" fmla="*/ 2436649 w 6858001"/>
+              <a:gd name="connsiteY22" fmla="*/ 226249 h 8030691"/>
+              <a:gd name="connsiteX23" fmla="*/ 2564208 w 6858001"/>
+              <a:gd name="connsiteY23" fmla="*/ 230955 h 8030691"/>
+              <a:gd name="connsiteX24" fmla="*/ 2694509 w 6858001"/>
+              <a:gd name="connsiteY24" fmla="*/ 236166 h 8030691"/>
+              <a:gd name="connsiteX25" fmla="*/ 2826869 w 6858001"/>
+              <a:gd name="connsiteY25" fmla="*/ 241040 h 8030691"/>
+              <a:gd name="connsiteX26" fmla="*/ 2959914 w 6858001"/>
+              <a:gd name="connsiteY26" fmla="*/ 244234 h 8030691"/>
+              <a:gd name="connsiteX27" fmla="*/ 3095702 w 6858001"/>
+              <a:gd name="connsiteY27" fmla="*/ 247092 h 8030691"/>
+              <a:gd name="connsiteX28" fmla="*/ 3232862 w 6858001"/>
+              <a:gd name="connsiteY28" fmla="*/ 250117 h 8030691"/>
+              <a:gd name="connsiteX29" fmla="*/ 3372766 w 6858001"/>
+              <a:gd name="connsiteY29" fmla="*/ 252134 h 8030691"/>
+              <a:gd name="connsiteX30" fmla="*/ 3514040 w 6858001"/>
+              <a:gd name="connsiteY30" fmla="*/ 252134 h 8030691"/>
+              <a:gd name="connsiteX31" fmla="*/ 3656686 w 6858001"/>
+              <a:gd name="connsiteY31" fmla="*/ 253143 h 8030691"/>
+              <a:gd name="connsiteX32" fmla="*/ 3800705 w 6858001"/>
+              <a:gd name="connsiteY32" fmla="*/ 252134 h 8030691"/>
+              <a:gd name="connsiteX33" fmla="*/ 3946780 w 6858001"/>
+              <a:gd name="connsiteY33" fmla="*/ 250117 h 8030691"/>
+              <a:gd name="connsiteX34" fmla="*/ 4092856 w 6858001"/>
+              <a:gd name="connsiteY34" fmla="*/ 248268 h 8030691"/>
+              <a:gd name="connsiteX35" fmla="*/ 4240988 w 6858001"/>
+              <a:gd name="connsiteY35" fmla="*/ 244234 h 8030691"/>
+              <a:gd name="connsiteX36" fmla="*/ 4390492 w 6858001"/>
+              <a:gd name="connsiteY36" fmla="*/ 240032 h 8030691"/>
+              <a:gd name="connsiteX37" fmla="*/ 4539997 w 6858001"/>
+              <a:gd name="connsiteY37" fmla="*/ 235157 h 8030691"/>
+              <a:gd name="connsiteX38" fmla="*/ 4690873 w 6858001"/>
+              <a:gd name="connsiteY38" fmla="*/ 228266 h 8030691"/>
+              <a:gd name="connsiteX39" fmla="*/ 4843120 w 6858001"/>
+              <a:gd name="connsiteY39" fmla="*/ 220029 h 8030691"/>
+              <a:gd name="connsiteX40" fmla="*/ 4996054 w 6858001"/>
+              <a:gd name="connsiteY40" fmla="*/ 212129 h 8030691"/>
+              <a:gd name="connsiteX41" fmla="*/ 5148987 w 6858001"/>
+              <a:gd name="connsiteY41" fmla="*/ 202044 h 8030691"/>
+              <a:gd name="connsiteX42" fmla="*/ 5303978 w 6858001"/>
+              <a:gd name="connsiteY42" fmla="*/ 189941 h 8030691"/>
+              <a:gd name="connsiteX43" fmla="*/ 5456911 w 6858001"/>
+              <a:gd name="connsiteY43" fmla="*/ 177839 h 8030691"/>
+              <a:gd name="connsiteX44" fmla="*/ 5612588 w 6858001"/>
+              <a:gd name="connsiteY44" fmla="*/ 163887 h 8030691"/>
+              <a:gd name="connsiteX45" fmla="*/ 5768950 w 6858001"/>
+              <a:gd name="connsiteY45" fmla="*/ 148591 h 8030691"/>
+              <a:gd name="connsiteX46" fmla="*/ 5923255 w 6858001"/>
+              <a:gd name="connsiteY46" fmla="*/ 132455 h 8030691"/>
+              <a:gd name="connsiteX47" fmla="*/ 6079618 w 6858001"/>
+              <a:gd name="connsiteY47" fmla="*/ 113629 h 8030691"/>
+              <a:gd name="connsiteX48" fmla="*/ 6235294 w 6858001"/>
+              <a:gd name="connsiteY48" fmla="*/ 93458 h 8030691"/>
+              <a:gd name="connsiteX49" fmla="*/ 6391657 w 6858001"/>
+              <a:gd name="connsiteY49" fmla="*/ 73455 h 8030691"/>
+              <a:gd name="connsiteX50" fmla="*/ 6547333 w 6858001"/>
+              <a:gd name="connsiteY50" fmla="*/ 50091 h 8030691"/>
+              <a:gd name="connsiteX51" fmla="*/ 6702324 w 6858001"/>
+              <a:gd name="connsiteY51" fmla="*/ 26222 h 8030691"/>
+            </a:gdLst>
+            <a:ahLst/>
+            <a:cxnLst>
+              <a:cxn ang="0">
+                <a:pos x="connsiteX0" y="connsiteY0"/>
+              </a:cxn>
+              <a:cxn ang="0">
+                <a:pos x="connsiteX1" y="connsiteY1"/>
+              </a:cxn>
+              <a:cxn ang="0">
+                <a:pos x="connsiteX2" y="connsiteY2"/>
+              </a:cxn>
+              <a:cxn ang="0">
+                <a:pos x="connsiteX3" y="connsiteY3"/>
+              </a:cxn>
+              <a:cxn ang="0">
+                <a:pos x="connsiteX4" y="connsiteY4"/>
+              </a:cxn>
+              <a:cxn ang="0">
+                <a:pos x="connsiteX5" y="connsiteY5"/>
+              </a:cxn>
+              <a:cxn ang="0">
+                <a:pos x="connsiteX6" y="connsiteY6"/>
+              </a:cxn>
+              <a:cxn ang="0">
+                <a:pos x="connsiteX7" y="connsiteY7"/>
+              </a:cxn>
+              <a:cxn ang="0">
+                <a:pos x="connsiteX8" y="connsiteY8"/>
+              </a:cxn>
+              <a:cxn ang="0">
+                <a:pos x="connsiteX9" y="connsiteY9"/>
+              </a:cxn>
+              <a:cxn ang="0">
+                <a:pos x="connsiteX10" y="connsiteY10"/>
+              </a:cxn>
+              <a:cxn ang="0">
+                <a:pos x="connsiteX11" y="connsiteY11"/>
+              </a:cxn>
+              <a:cxn ang="0">
+                <a:pos x="connsiteX12" y="connsiteY12"/>
+              </a:cxn>
+              <a:cxn ang="0">
+                <a:pos x="connsiteX13" y="connsiteY13"/>
+              </a:cxn>
+              <a:cxn ang="0">
+                <a:pos x="connsiteX14" y="connsiteY14"/>
+              </a:cxn>
+              <a:cxn ang="0">
+                <a:pos x="connsiteX15" y="connsiteY15"/>
+              </a:cxn>
+              <a:cxn ang="0">
+                <a:pos x="connsiteX16" y="connsiteY16"/>
+              </a:cxn>
+              <a:cxn ang="0">
+                <a:pos x="connsiteX17" y="connsiteY17"/>
+              </a:cxn>
+              <a:cxn ang="0">
+                <a:pos x="connsiteX18" y="connsiteY18"/>
+              </a:cxn>
+              <a:cxn ang="0">
+                <a:pos x="connsiteX19" y="connsiteY19"/>
+              </a:cxn>
+              <a:cxn ang="0">
+                <a:pos x="connsiteX20" y="connsiteY20"/>
+              </a:cxn>
+              <a:cxn ang="0">
+                <a:pos x="connsiteX21" y="connsiteY21"/>
+              </a:cxn>
+              <a:cxn ang="0">
+                <a:pos x="connsiteX22" y="connsiteY22"/>
+              </a:cxn>
+              <a:cxn ang="0">
+                <a:pos x="connsiteX23" y="connsiteY23"/>
+              </a:cxn>
+              <a:cxn ang="0">
+                <a:pos x="connsiteX24" y="connsiteY24"/>
+              </a:cxn>
+              <a:cxn ang="0">
+                <a:pos x="connsiteX25" y="connsiteY25"/>
+              </a:cxn>
+              <a:cxn ang="0">
+                <a:pos x="connsiteX26" y="connsiteY26"/>
+              </a:cxn>
+              <a:cxn ang="0">
+                <a:pos x="connsiteX27" y="connsiteY27"/>
+              </a:cxn>
+              <a:cxn ang="0">
+                <a:pos x="connsiteX28" y="connsiteY28"/>
+              </a:cxn>
+              <a:cxn ang="0">
+                <a:pos x="connsiteX29" y="connsiteY29"/>
+              </a:cxn>
+              <a:cxn ang="0">
+                <a:pos x="connsiteX30" y="connsiteY30"/>
+              </a:cxn>
+              <a:cxn ang="0">
+                <a:pos x="connsiteX31" y="connsiteY31"/>
+              </a:cxn>
+              <a:cxn ang="0">
+                <a:pos x="connsiteX32" y="connsiteY32"/>
+              </a:cxn>
+              <a:cxn ang="0">
+                <a:pos x="connsiteX33" y="connsiteY33"/>
+              </a:cxn>
+              <a:cxn ang="0">
+                <a:pos x="connsiteX34" y="connsiteY34"/>
+              </a:cxn>
+              <a:cxn ang="0">
+                <a:pos x="connsiteX35" y="connsiteY35"/>
+              </a:cxn>
+              <a:cxn ang="0">
+                <a:pos x="connsiteX36" y="connsiteY36"/>
+              </a:cxn>
+              <a:cxn ang="0">
+                <a:pos x="connsiteX37" y="connsiteY37"/>
+              </a:cxn>
+              <a:cxn ang="0">
+                <a:pos x="connsiteX38" y="connsiteY38"/>
+              </a:cxn>
+              <a:cxn ang="0">
+                <a:pos x="connsiteX39" y="connsiteY39"/>
+              </a:cxn>
+              <a:cxn ang="0">
+                <a:pos x="connsiteX40" y="connsiteY40"/>
+              </a:cxn>
+              <a:cxn ang="0">
+                <a:pos x="connsiteX41" y="connsiteY41"/>
+              </a:cxn>
+              <a:cxn ang="0">
+                <a:pos x="connsiteX42" y="connsiteY42"/>
+              </a:cxn>
+              <a:cxn ang="0">
+                <a:pos x="connsiteX43" y="connsiteY43"/>
+              </a:cxn>
+              <a:cxn ang="0">
+                <a:pos x="connsiteX44" y="connsiteY44"/>
+              </a:cxn>
+              <a:cxn ang="0">
+                <a:pos x="connsiteX45" y="connsiteY45"/>
+              </a:cxn>
+              <a:cxn ang="0">
+                <a:pos x="connsiteX46" y="connsiteY46"/>
+              </a:cxn>
+              <a:cxn ang="0">
+                <a:pos x="connsiteX47" y="connsiteY47"/>
+              </a:cxn>
+              <a:cxn ang="0">
+                <a:pos x="connsiteX48" y="connsiteY48"/>
+              </a:cxn>
+              <a:cxn ang="0">
+                <a:pos x="connsiteX49" y="connsiteY49"/>
+              </a:cxn>
+              <a:cxn ang="0">
+                <a:pos x="connsiteX50" y="connsiteY50"/>
+              </a:cxn>
+              <a:cxn ang="0">
+                <a:pos x="connsiteX51" y="connsiteY51"/>
+              </a:cxn>
+            </a:cxnLst>
+            <a:rect l="l" t="t" r="r" b="b"/>
+            <a:pathLst>
+              <a:path w="6858001" h="8030691">
+                <a:moveTo>
+                  <a:pt x="6858001" y="1177"/>
+                </a:moveTo>
+                <a:lnTo>
+                  <a:pt x="6858001" y="1344715"/>
+                </a:lnTo>
+                <a:lnTo>
+                  <a:pt x="6858000" y="1344715"/>
+                </a:lnTo>
+                <a:lnTo>
+                  <a:pt x="6858000" y="8030691"/>
+                </a:lnTo>
+                <a:lnTo>
+                  <a:pt x="0" y="8030690"/>
+                </a:lnTo>
+                <a:lnTo>
+                  <a:pt x="0" y="477747"/>
+                </a:lnTo>
+                <a:lnTo>
+                  <a:pt x="1" y="477747"/>
+                </a:lnTo>
+                <a:lnTo>
+                  <a:pt x="1" y="0"/>
+                </a:lnTo>
+                <a:lnTo>
+                  <a:pt x="40463" y="5883"/>
+                </a:lnTo>
+                <a:lnTo>
+                  <a:pt x="159107" y="23196"/>
+                </a:lnTo>
+                <a:lnTo>
+                  <a:pt x="245518" y="35299"/>
+                </a:lnTo>
+                <a:lnTo>
+                  <a:pt x="348388" y="48074"/>
+                </a:lnTo>
+                <a:lnTo>
+                  <a:pt x="470460" y="63370"/>
+                </a:lnTo>
+                <a:lnTo>
+                  <a:pt x="605563" y="79507"/>
+                </a:lnTo>
+                <a:lnTo>
+                  <a:pt x="757810" y="96484"/>
+                </a:lnTo>
+                <a:lnTo>
+                  <a:pt x="923774" y="114469"/>
+                </a:lnTo>
+                <a:lnTo>
+                  <a:pt x="1104139" y="132455"/>
+                </a:lnTo>
+                <a:lnTo>
+                  <a:pt x="1296163" y="150776"/>
+                </a:lnTo>
+                <a:lnTo>
+                  <a:pt x="1503275" y="167753"/>
+                </a:lnTo>
+                <a:lnTo>
+                  <a:pt x="1719988" y="184058"/>
+                </a:lnTo>
+                <a:lnTo>
+                  <a:pt x="1949045" y="198850"/>
+                </a:lnTo>
+                <a:lnTo>
+                  <a:pt x="2187703" y="212969"/>
+                </a:lnTo>
+                <a:lnTo>
+                  <a:pt x="2436649" y="226249"/>
+                </a:lnTo>
+                <a:lnTo>
+                  <a:pt x="2564208" y="230955"/>
+                </a:lnTo>
+                <a:lnTo>
+                  <a:pt x="2694509" y="236166"/>
+                </a:lnTo>
+                <a:lnTo>
+                  <a:pt x="2826869" y="241040"/>
+                </a:lnTo>
+                <a:lnTo>
+                  <a:pt x="2959914" y="244234"/>
+                </a:lnTo>
+                <a:lnTo>
+                  <a:pt x="3095702" y="247092"/>
+                </a:lnTo>
+                <a:lnTo>
+                  <a:pt x="3232862" y="250117"/>
+                </a:lnTo>
+                <a:lnTo>
+                  <a:pt x="3372766" y="252134"/>
+                </a:lnTo>
+                <a:lnTo>
+                  <a:pt x="3514040" y="252134"/>
+                </a:lnTo>
+                <a:lnTo>
+                  <a:pt x="3656686" y="253143"/>
+                </a:lnTo>
+                <a:lnTo>
+                  <a:pt x="3800705" y="252134"/>
+                </a:lnTo>
+                <a:lnTo>
+                  <a:pt x="3946780" y="250117"/>
+                </a:lnTo>
+                <a:lnTo>
+                  <a:pt x="4092856" y="248268"/>
+                </a:lnTo>
+                <a:lnTo>
+                  <a:pt x="4240988" y="244234"/>
+                </a:lnTo>
+                <a:lnTo>
+                  <a:pt x="4390492" y="240032"/>
+                </a:lnTo>
+                <a:lnTo>
+                  <a:pt x="4539997" y="235157"/>
+                </a:lnTo>
+                <a:lnTo>
+                  <a:pt x="4690873" y="228266"/>
+                </a:lnTo>
+                <a:lnTo>
+                  <a:pt x="4843120" y="220029"/>
+                </a:lnTo>
+                <a:lnTo>
+                  <a:pt x="4996054" y="212129"/>
+                </a:lnTo>
+                <a:lnTo>
+                  <a:pt x="5148987" y="202044"/>
+                </a:lnTo>
+                <a:lnTo>
+                  <a:pt x="5303978" y="189941"/>
+                </a:lnTo>
+                <a:lnTo>
+                  <a:pt x="5456911" y="177839"/>
+                </a:lnTo>
+                <a:lnTo>
+                  <a:pt x="5612588" y="163887"/>
+                </a:lnTo>
+                <a:lnTo>
+                  <a:pt x="5768950" y="148591"/>
+                </a:lnTo>
+                <a:lnTo>
+                  <a:pt x="5923255" y="132455"/>
+                </a:lnTo>
+                <a:lnTo>
+                  <a:pt x="6079618" y="113629"/>
+                </a:lnTo>
+                <a:lnTo>
+                  <a:pt x="6235294" y="93458"/>
+                </a:lnTo>
+                <a:lnTo>
+                  <a:pt x="6391657" y="73455"/>
+                </a:lnTo>
+                <a:lnTo>
+                  <a:pt x="6547333" y="50091"/>
+                </a:lnTo>
+                <a:lnTo>
+                  <a:pt x="6702324" y="26222"/>
+                </a:lnTo>
+                <a:close/>
+              </a:path>
+            </a:pathLst>
+          </a:custGeom>
+          <a:ln>
+            <a:noFill/>
+          </a:ln>
+        </p:spPr>
+      </p:sp>
+      <p:sp>
+        <p:nvSpPr>
+          <p:cNvPr id="28" name="Rectangle 27">
+            <a:extLst>
+              <a:ext uri="{FF2B5EF4-FFF2-40B4-BE49-F238E27FC236}">
+                <a16:creationId xmlns:a16="http://schemas.microsoft.com/office/drawing/2014/main" id="{A4B31EAA-7423-46F7-9B90-4AB2B09C35C4}"/>
+              </a:ext>
+              <a:ext uri="{C183D7F6-B498-43B3-948B-1728B52AA6E4}">
+                <adec:decorative xmlns:adec="http://schemas.microsoft.com/office/drawing/2017/decorative" val="1"/>
+              </a:ext>
+            </a:extLst>
+          </p:cNvPr>
+          <p:cNvSpPr>
+            <a:spLocks noGrp="1" noRot="1" noChangeAspect="1" noMove="1" noResize="1" noEditPoints="1" noAdjustHandles="1" noChangeArrowheads="1" noChangeShapeType="1" noTextEdit="1"/>
+          </p:cNvSpPr>
+          <p:nvPr>
+            <p:extLst>
+              <p:ext uri="{386F3935-93C4-4BCD-93E2-E3B085C9AB24}">
+                <p16:designElem xmlns:p16="http://schemas.microsoft.com/office/powerpoint/2015/main" val="1"/>
+              </p:ext>
+            </p:extLst>
+          </p:nvPr>
+        </p:nvSpPr>
+        <p:spPr>
+          <a:xfrm>
+            <a:off x="10437812" y="0"/>
+            <a:ext cx="685800" cy="1143000"/>
+          </a:xfrm>
+          <a:prstGeom prst="rect">
+            <a:avLst/>
+          </a:prstGeom>
+          <a:solidFill>
+            <a:schemeClr val="accent1"/>
+          </a:solidFill>
+          <a:ln>
+            <a:noFill/>
+          </a:ln>
+        </p:spPr>
+        <p:style>
+          <a:lnRef idx="1">
+            <a:schemeClr val="accent1"/>
+          </a:lnRef>
+          <a:fillRef idx="3">
+            <a:schemeClr val="accent1"/>
+          </a:fillRef>
+          <a:effectRef idx="2">
+            <a:schemeClr val="accent1"/>
+          </a:effectRef>
+          <a:fontRef idx="minor">
+            <a:schemeClr val="lt1"/>
+          </a:fontRef>
+        </p:style>
+      </p:sp>
+      <p:pic>
+        <p:nvPicPr>
+          <p:cNvPr id="5" name="Content Placeholder 5">
+            <a:extLst>
+              <a:ext uri="{FF2B5EF4-FFF2-40B4-BE49-F238E27FC236}">
+                <a16:creationId xmlns:a16="http://schemas.microsoft.com/office/drawing/2014/main" id="{743B7B4A-157E-48C2-B685-2573E19790D1}"/>
+              </a:ext>
+            </a:extLst>
+          </p:cNvPr>
+          <p:cNvPicPr>
+            <a:picLocks noGrp="1" noChangeAspect="1"/>
+          </p:cNvPicPr>
+          <p:nvPr>
+            <p:ph sz="half" idx="2"/>
+          </p:nvPr>
+        </p:nvPicPr>
+        <p:blipFill>
+          <a:blip r:embed="rId6"/>
+          <a:stretch>
+            <a:fillRect/>
+          </a:stretch>
+        </p:blipFill>
+        <p:spPr>
+          <a:xfrm>
+            <a:off x="5048451" y="1905423"/>
+            <a:ext cx="6495847" cy="3656753"/>
+          </a:xfrm>
+          <a:prstGeom prst="rect">
+            <a:avLst/>
+          </a:prstGeom>
+          <a:effectLst/>
+        </p:spPr>
+      </p:pic>
+      <p:sp>
+        <p:nvSpPr>
+          <p:cNvPr id="2" name="Title 1">
+            <a:extLst>
+              <a:ext uri="{FF2B5EF4-FFF2-40B4-BE49-F238E27FC236}">
+                <a16:creationId xmlns:a16="http://schemas.microsoft.com/office/drawing/2014/main" id="{37B755F9-F7FE-4824-AE59-EE6C93A6E38C}"/>
+              </a:ext>
+            </a:extLst>
+          </p:cNvPr>
+          <p:cNvSpPr>
+            <a:spLocks noGrp="1"/>
+          </p:cNvSpPr>
+          <p:nvPr>
+            <p:ph type="title"/>
+          </p:nvPr>
+        </p:nvSpPr>
+        <p:spPr>
+          <a:xfrm>
+            <a:off x="643855" y="1447799"/>
+            <a:ext cx="3108626" cy="1444752"/>
+          </a:xfrm>
+        </p:spPr>
+        <p:txBody>
+          <a:bodyPr vert="horz" lIns="91440" tIns="45720" rIns="91440" bIns="45720" rtlCol="0" anchor="b">
+            <a:normAutofit/>
+          </a:bodyPr>
+          <a:lstStyle/>
+          <a:p>
+            <a:r>
+              <a:rPr lang="en-US" sz="3200" b="0" i="0" kern="1200" dirty="0">
+                <a:solidFill>
+                  <a:srgbClr val="EBEBEB"/>
+                </a:solidFill>
+                <a:latin typeface="+mj-lt"/>
+                <a:ea typeface="+mj-ea"/>
+                <a:cs typeface="+mj-cs"/>
+              </a:rPr>
+              <a:t>COMMIT GRAPH</a:t>
+            </a:r>
+          </a:p>
+        </p:txBody>
+      </p:sp>
       <p:sp>
         <p:nvSpPr>
           <p:cNvPr id="3" name="Content Placeholder 2">
             <a:extLst>
               <a:ext uri="{FF2B5EF4-FFF2-40B4-BE49-F238E27FC236}">
-                <a16:creationId xmlns:a16="http://schemas.microsoft.com/office/drawing/2014/main" id="{DF07826F-0B22-7245-B547-F198DDAFCE11}"/>
+                <a16:creationId xmlns:a16="http://schemas.microsoft.com/office/drawing/2014/main" id="{4DD8DE7F-37A5-432A-8530-616969767384}"/>
               </a:ext>
             </a:extLst>
           </p:cNvPr>
@@ -8923,100 +10366,1249 @@
             <a:spLocks noGrp="1"/>
           </p:cNvSpPr>
           <p:nvPr>
-            <p:ph idx="1"/>
+            <p:ph sz="half" idx="1"/>
           </p:nvPr>
         </p:nvSpPr>
         <p:spPr>
           <a:xfrm>
-            <a:off x="858644" y="557562"/>
-            <a:ext cx="9191209" cy="5690838"/>
+            <a:off x="643855" y="3072385"/>
+            <a:ext cx="3108057" cy="2947415"/>
           </a:xfrm>
         </p:spPr>
         <p:txBody>
-          <a:bodyPr/>
+          <a:bodyPr vert="horz" lIns="91440" tIns="45720" rIns="91440" bIns="45720" rtlCol="0">
+            <a:normAutofit/>
+          </a:bodyPr>
           <a:lstStyle/>
           <a:p>
-            <a:pPr>
-              <a:lnSpc>
-                <a:spcPct val="200000"/>
-              </a:lnSpc>
-            </a:pPr>
-            <a:r>
-              <a:rPr lang="en-US" dirty="0"/>
-              <a:t>Git is </a:t>
-            </a:r>
-            <a:r>
-              <a:rPr lang="en-US" b="1" dirty="0"/>
-              <a:t>locally enabled</a:t>
-            </a:r>
-            <a:r>
-              <a:rPr lang="en-US" dirty="0"/>
-              <a:t> so you can version control items just on your desktop.</a:t>
-            </a:r>
-          </a:p>
-          <a:p>
-            <a:pPr>
-              <a:lnSpc>
-                <a:spcPct val="200000"/>
-              </a:lnSpc>
-            </a:pPr>
-            <a:r>
-              <a:rPr lang="en-US" b="1" dirty="0"/>
-              <a:t>Team-centric: </a:t>
-            </a:r>
-            <a:r>
-              <a:rPr lang="en-US" dirty="0"/>
-              <a:t>It allows teams to work in sequential or parallel fashion (using feature branches) and </a:t>
-            </a:r>
-            <a:r>
-              <a:rPr lang="en-US" b="1" dirty="0"/>
-              <a:t>merge</a:t>
-            </a:r>
-            <a:r>
-              <a:rPr lang="en-US" dirty="0"/>
-              <a:t> their code to complete the project.</a:t>
-            </a:r>
-            <a:endParaRPr lang="en-US" b="1" dirty="0"/>
-          </a:p>
-          <a:p>
-            <a:pPr>
-              <a:lnSpc>
-                <a:spcPct val="200000"/>
-              </a:lnSpc>
-            </a:pPr>
-            <a:r>
-              <a:rPr lang="en-US" b="1" dirty="0"/>
-              <a:t>History tracking</a:t>
-            </a:r>
-            <a:r>
-              <a:rPr lang="en-US" dirty="0"/>
-              <a:t>: You can see a history of all your commits since the beginning of your project thanks to Git.</a:t>
-            </a:r>
-          </a:p>
-          <a:p>
-            <a:pPr>
-              <a:lnSpc>
-                <a:spcPct val="200000"/>
-              </a:lnSpc>
-            </a:pPr>
-            <a:endParaRPr lang="en-US" dirty="0"/>
+            <a:r>
+              <a:rPr lang="en-US" sz="1400" dirty="0">
+                <a:solidFill>
+                  <a:srgbClr val="FFFFFF"/>
+                </a:solidFill>
+              </a:rPr>
+              <a:t>Commits can be represented as a graph</a:t>
+            </a:r>
+          </a:p>
+          <a:p>
+            <a:endParaRPr lang="en-US" sz="1400" dirty="0">
+              <a:solidFill>
+                <a:srgbClr val="FFFFFF"/>
+              </a:solidFill>
+            </a:endParaRPr>
           </a:p>
         </p:txBody>
       </p:sp>
     </p:spTree>
     <p:extLst>
       <p:ext uri="{BB962C8B-B14F-4D97-AF65-F5344CB8AC3E}">
-        <p14:creationId xmlns:p14="http://schemas.microsoft.com/office/powerpoint/2010/main" val="612575497"/>
+        <p14:creationId xmlns:p14="http://schemas.microsoft.com/office/powerpoint/2010/main" val="321200571"/>
       </p:ext>
     </p:extLst>
   </p:cSld>
   <p:clrMapOvr>
-    <a:masterClrMapping/>
+    <a:overrideClrMapping bg1="lt1" tx1="dk1" bg2="lt2" tx2="dk2" accent1="accent1" accent2="accent2" accent3="accent3" accent4="accent4" accent5="accent5" accent6="accent6" hlink="hlink" folHlink="folHlink"/>
   </p:clrMapOvr>
 </p:sld>
 </file>
 
 <file path=ppt/slides/slide6.xml><?xml version="1.0" encoding="utf-8"?>
+<p:sld xmlns:a="http://schemas.openxmlformats.org/drawingml/2006/main" xmlns:r="http://schemas.openxmlformats.org/officeDocument/2006/relationships" xmlns:p="http://schemas.openxmlformats.org/presentationml/2006/main">
+  <p:cSld>
+    <p:bg>
+      <p:bgPr>
+        <a:solidFill>
+          <a:schemeClr val="bg1"/>
+        </a:solidFill>
+        <a:effectLst/>
+      </p:bgPr>
+    </p:bg>
+    <p:spTree>
+      <p:nvGrpSpPr>
+        <p:cNvPr id="1" name=""/>
+        <p:cNvGrpSpPr/>
+        <p:nvPr/>
+      </p:nvGrpSpPr>
+      <p:grpSpPr>
+        <a:xfrm>
+          <a:off x="0" y="0"/>
+          <a:ext cx="0" cy="0"/>
+          <a:chOff x="0" y="0"/>
+          <a:chExt cx="0" cy="0"/>
+        </a:xfrm>
+      </p:grpSpPr>
+      <p:pic>
+        <p:nvPicPr>
+          <p:cNvPr id="10" name="Picture 9">
+            <a:extLst>
+              <a:ext uri="{FF2B5EF4-FFF2-40B4-BE49-F238E27FC236}">
+                <a16:creationId xmlns:a16="http://schemas.microsoft.com/office/drawing/2014/main" id="{41B68C77-138E-4BF7-A276-BD0C78A4219F}"/>
+              </a:ext>
+              <a:ext uri="{C183D7F6-B498-43B3-948B-1728B52AA6E4}">
+                <adec:decorative xmlns:adec="http://schemas.microsoft.com/office/drawing/2017/decorative" val="1"/>
+              </a:ext>
+            </a:extLst>
+          </p:cNvPr>
+          <p:cNvPicPr>
+            <a:picLocks noGrp="1" noRot="1" noChangeAspect="1" noMove="1" noResize="1" noEditPoints="1" noAdjustHandles="1" noChangeArrowheads="1" noChangeShapeType="1" noCrop="1"/>
+          </p:cNvPicPr>
+          <p:nvPr>
+            <p:extLst>
+              <p:ext uri="{386F3935-93C4-4BCD-93E2-E3B085C9AB24}">
+                <p16:designElem xmlns:p16="http://schemas.microsoft.com/office/powerpoint/2015/main" val="1"/>
+              </p:ext>
+            </p:extLst>
+          </p:nvPr>
+        </p:nvPicPr>
+        <p:blipFill rotWithShape="1">
+          <a:blip r:embed="rId2">
+            <a:extLst>
+              <a:ext uri="{28A0092B-C50C-407E-A947-70E740481C1C}">
+                <a14:useLocalDpi xmlns:a14="http://schemas.microsoft.com/office/drawing/2010/main" val="0"/>
+              </a:ext>
+            </a:extLst>
+          </a:blip>
+          <a:srcRect l="3613"/>
+          <a:stretch/>
+        </p:blipFill>
+        <p:spPr>
+          <a:xfrm>
+            <a:off x="0" y="2669685"/>
+            <a:ext cx="4037012" cy="4188315"/>
+          </a:xfrm>
+          <a:prstGeom prst="rect">
+            <a:avLst/>
+          </a:prstGeom>
+        </p:spPr>
+      </p:pic>
+      <p:pic>
+        <p:nvPicPr>
+          <p:cNvPr id="12" name="Picture 11">
+            <a:extLst>
+              <a:ext uri="{FF2B5EF4-FFF2-40B4-BE49-F238E27FC236}">
+                <a16:creationId xmlns:a16="http://schemas.microsoft.com/office/drawing/2014/main" id="{7C268552-D473-46ED-B1B8-422042C4DEF1}"/>
+              </a:ext>
+              <a:ext uri="{C183D7F6-B498-43B3-948B-1728B52AA6E4}">
+                <adec:decorative xmlns:adec="http://schemas.microsoft.com/office/drawing/2017/decorative" val="1"/>
+              </a:ext>
+            </a:extLst>
+          </p:cNvPr>
+          <p:cNvPicPr>
+            <a:picLocks noGrp="1" noRot="1" noChangeAspect="1" noMove="1" noResize="1" noEditPoints="1" noAdjustHandles="1" noChangeArrowheads="1" noChangeShapeType="1" noCrop="1"/>
+          </p:cNvPicPr>
+          <p:nvPr>
+            <p:extLst>
+              <p:ext uri="{386F3935-93C4-4BCD-93E2-E3B085C9AB24}">
+                <p16:designElem xmlns:p16="http://schemas.microsoft.com/office/powerpoint/2015/main" val="1"/>
+              </p:ext>
+            </p:extLst>
+          </p:nvPr>
+        </p:nvPicPr>
+        <p:blipFill rotWithShape="1">
+          <a:blip r:embed="rId3">
+            <a:extLst>
+              <a:ext uri="{28A0092B-C50C-407E-A947-70E740481C1C}">
+                <a14:useLocalDpi xmlns:a14="http://schemas.microsoft.com/office/drawing/2010/main" val="0"/>
+              </a:ext>
+            </a:extLst>
+          </a:blip>
+          <a:srcRect l="35640"/>
+          <a:stretch/>
+        </p:blipFill>
+        <p:spPr>
+          <a:xfrm>
+            <a:off x="0" y="2892347"/>
+            <a:ext cx="1522412" cy="2365453"/>
+          </a:xfrm>
+          <a:prstGeom prst="rect">
+            <a:avLst/>
+          </a:prstGeom>
+        </p:spPr>
+      </p:pic>
+      <p:sp>
+        <p:nvSpPr>
+          <p:cNvPr id="14" name="Oval 13">
+            <a:extLst>
+              <a:ext uri="{FF2B5EF4-FFF2-40B4-BE49-F238E27FC236}">
+                <a16:creationId xmlns:a16="http://schemas.microsoft.com/office/drawing/2014/main" id="{4AC0CD9D-7610-4620-93B4-798CCD9AB581}"/>
+              </a:ext>
+              <a:ext uri="{C183D7F6-B498-43B3-948B-1728B52AA6E4}">
+                <adec:decorative xmlns:adec="http://schemas.microsoft.com/office/drawing/2017/decorative" val="1"/>
+              </a:ext>
+            </a:extLst>
+          </p:cNvPr>
+          <p:cNvSpPr>
+            <a:spLocks noGrp="1" noRot="1" noChangeAspect="1" noMove="1" noResize="1" noEditPoints="1" noAdjustHandles="1" noChangeArrowheads="1" noChangeShapeType="1" noTextEdit="1"/>
+          </p:cNvSpPr>
+          <p:nvPr>
+            <p:extLst>
+              <p:ext uri="{386F3935-93C4-4BCD-93E2-E3B085C9AB24}">
+                <p16:designElem xmlns:p16="http://schemas.microsoft.com/office/powerpoint/2015/main" val="1"/>
+              </p:ext>
+            </p:extLst>
+          </p:nvPr>
+        </p:nvSpPr>
+        <p:spPr>
+          <a:xfrm>
+            <a:off x="8609012" y="1676400"/>
+            <a:ext cx="2819400" cy="2819400"/>
+          </a:xfrm>
+          <a:prstGeom prst="ellipse">
+            <a:avLst/>
+          </a:prstGeom>
+          <a:gradFill flip="none" rotWithShape="1">
+            <a:gsLst>
+              <a:gs pos="0">
+                <a:schemeClr val="bg2">
+                  <a:lumMod val="60000"/>
+                  <a:lumOff val="40000"/>
+                  <a:alpha val="7000"/>
+                </a:schemeClr>
+              </a:gs>
+              <a:gs pos="69000">
+                <a:schemeClr val="bg2">
+                  <a:lumMod val="60000"/>
+                  <a:lumOff val="40000"/>
+                  <a:alpha val="0"/>
+                </a:schemeClr>
+              </a:gs>
+              <a:gs pos="36000">
+                <a:schemeClr val="bg2">
+                  <a:lumMod val="60000"/>
+                  <a:lumOff val="40000"/>
+                  <a:alpha val="6000"/>
+                </a:schemeClr>
+              </a:gs>
+            </a:gsLst>
+            <a:path path="circle">
+              <a:fillToRect l="50000" t="50000" r="50000" b="50000"/>
+            </a:path>
+            <a:tileRect/>
+          </a:gradFill>
+          <a:ln>
+            <a:noFill/>
+          </a:ln>
+          <a:effectLst/>
+        </p:spPr>
+        <p:style>
+          <a:lnRef idx="1">
+            <a:schemeClr val="accent1"/>
+          </a:lnRef>
+          <a:fillRef idx="3">
+            <a:schemeClr val="accent1"/>
+          </a:fillRef>
+          <a:effectRef idx="2">
+            <a:schemeClr val="accent1"/>
+          </a:effectRef>
+          <a:fontRef idx="minor">
+            <a:schemeClr val="lt1"/>
+          </a:fontRef>
+        </p:style>
+      </p:sp>
+      <p:pic>
+        <p:nvPicPr>
+          <p:cNvPr id="16" name="Picture 15">
+            <a:extLst>
+              <a:ext uri="{FF2B5EF4-FFF2-40B4-BE49-F238E27FC236}">
+                <a16:creationId xmlns:a16="http://schemas.microsoft.com/office/drawing/2014/main" id="{B9238B3E-24AA-439A-B527-6C5DF6D72145}"/>
+              </a:ext>
+              <a:ext uri="{C183D7F6-B498-43B3-948B-1728B52AA6E4}">
+                <adec:decorative xmlns:adec="http://schemas.microsoft.com/office/drawing/2017/decorative" val="1"/>
+              </a:ext>
+            </a:extLst>
+          </p:cNvPr>
+          <p:cNvPicPr>
+            <a:picLocks noGrp="1" noRot="1" noChangeAspect="1" noMove="1" noResize="1" noEditPoints="1" noAdjustHandles="1" noChangeArrowheads="1" noChangeShapeType="1" noCrop="1"/>
+          </p:cNvPicPr>
+          <p:nvPr>
+            <p:extLst>
+              <p:ext uri="{386F3935-93C4-4BCD-93E2-E3B085C9AB24}">
+                <p16:designElem xmlns:p16="http://schemas.microsoft.com/office/powerpoint/2015/main" val="1"/>
+              </p:ext>
+            </p:extLst>
+          </p:nvPr>
+        </p:nvPicPr>
+        <p:blipFill rotWithShape="1">
+          <a:blip r:embed="rId4">
+            <a:extLst>
+              <a:ext uri="{28A0092B-C50C-407E-A947-70E740481C1C}">
+                <a14:useLocalDpi xmlns:a14="http://schemas.microsoft.com/office/drawing/2010/main" val="0"/>
+              </a:ext>
+            </a:extLst>
+          </a:blip>
+          <a:srcRect t="28813"/>
+          <a:stretch/>
+        </p:blipFill>
+        <p:spPr>
+          <a:xfrm>
+            <a:off x="7999412" y="0"/>
+            <a:ext cx="1603387" cy="1141407"/>
+          </a:xfrm>
+          <a:prstGeom prst="rect">
+            <a:avLst/>
+          </a:prstGeom>
+        </p:spPr>
+      </p:pic>
+      <p:pic>
+        <p:nvPicPr>
+          <p:cNvPr id="18" name="Picture 17">
+            <a:extLst>
+              <a:ext uri="{FF2B5EF4-FFF2-40B4-BE49-F238E27FC236}">
+                <a16:creationId xmlns:a16="http://schemas.microsoft.com/office/drawing/2014/main" id="{69F01145-BEA3-4CBF-AA21-10077B948CA8}"/>
+              </a:ext>
+              <a:ext uri="{C183D7F6-B498-43B3-948B-1728B52AA6E4}">
+                <adec:decorative xmlns:adec="http://schemas.microsoft.com/office/drawing/2017/decorative" val="1"/>
+              </a:ext>
+            </a:extLst>
+          </p:cNvPr>
+          <p:cNvPicPr>
+            <a:picLocks noGrp="1" noRot="1" noChangeAspect="1" noMove="1" noResize="1" noEditPoints="1" noAdjustHandles="1" noChangeArrowheads="1" noChangeShapeType="1" noCrop="1"/>
+          </p:cNvPicPr>
+          <p:nvPr>
+            <p:extLst>
+              <p:ext uri="{386F3935-93C4-4BCD-93E2-E3B085C9AB24}">
+                <p16:designElem xmlns:p16="http://schemas.microsoft.com/office/powerpoint/2015/main" val="1"/>
+              </p:ext>
+            </p:extLst>
+          </p:nvPr>
+        </p:nvPicPr>
+        <p:blipFill rotWithShape="1">
+          <a:blip r:embed="rId5">
+            <a:extLst>
+              <a:ext uri="{28A0092B-C50C-407E-A947-70E740481C1C}">
+                <a14:useLocalDpi xmlns:a14="http://schemas.microsoft.com/office/drawing/2010/main" val="0"/>
+              </a:ext>
+            </a:extLst>
+          </a:blip>
+          <a:srcRect b="23320"/>
+          <a:stretch/>
+        </p:blipFill>
+        <p:spPr>
+          <a:xfrm>
+            <a:off x="8605878" y="6096000"/>
+            <a:ext cx="993734" cy="762000"/>
+          </a:xfrm>
+          <a:prstGeom prst="rect">
+            <a:avLst/>
+          </a:prstGeom>
+        </p:spPr>
+      </p:pic>
+      <p:sp>
+        <p:nvSpPr>
+          <p:cNvPr id="20" name="Rectangle 19">
+            <a:extLst>
+              <a:ext uri="{FF2B5EF4-FFF2-40B4-BE49-F238E27FC236}">
+                <a16:creationId xmlns:a16="http://schemas.microsoft.com/office/drawing/2014/main" id="{DE4D62F9-188E-4530-84C2-24BDEE4BEB82}"/>
+              </a:ext>
+              <a:ext uri="{C183D7F6-B498-43B3-948B-1728B52AA6E4}">
+                <adec:decorative xmlns:adec="http://schemas.microsoft.com/office/drawing/2017/decorative" val="1"/>
+              </a:ext>
+            </a:extLst>
+          </p:cNvPr>
+          <p:cNvSpPr>
+            <a:spLocks noGrp="1" noRot="1" noChangeAspect="1" noMove="1" noResize="1" noEditPoints="1" noAdjustHandles="1" noChangeArrowheads="1" noChangeShapeType="1" noTextEdit="1"/>
+          </p:cNvSpPr>
+          <p:nvPr>
+            <p:extLst>
+              <p:ext uri="{386F3935-93C4-4BCD-93E2-E3B085C9AB24}">
+                <p16:designElem xmlns:p16="http://schemas.microsoft.com/office/powerpoint/2015/main" val="1"/>
+              </p:ext>
+            </p:extLst>
+          </p:nvPr>
+        </p:nvSpPr>
+        <p:spPr>
+          <a:xfrm>
+            <a:off x="10437812" y="0"/>
+            <a:ext cx="685800" cy="1143000"/>
+          </a:xfrm>
+          <a:prstGeom prst="rect">
+            <a:avLst/>
+          </a:prstGeom>
+          <a:solidFill>
+            <a:schemeClr val="accent1"/>
+          </a:solidFill>
+          <a:ln>
+            <a:noFill/>
+          </a:ln>
+        </p:spPr>
+        <p:style>
+          <a:lnRef idx="1">
+            <a:schemeClr val="accent1"/>
+          </a:lnRef>
+          <a:fillRef idx="3">
+            <a:schemeClr val="accent1"/>
+          </a:fillRef>
+          <a:effectRef idx="2">
+            <a:schemeClr val="accent1"/>
+          </a:effectRef>
+          <a:fontRef idx="minor">
+            <a:schemeClr val="lt1"/>
+          </a:fontRef>
+        </p:style>
+      </p:sp>
+      <p:sp>
+        <p:nvSpPr>
+          <p:cNvPr id="22" name="Rectangle 21">
+            <a:extLst>
+              <a:ext uri="{FF2B5EF4-FFF2-40B4-BE49-F238E27FC236}">
+                <a16:creationId xmlns:a16="http://schemas.microsoft.com/office/drawing/2014/main" id="{B4AAD3FD-83A5-4B89-9F8F-01B8870865BE}"/>
+              </a:ext>
+              <a:ext uri="{C183D7F6-B498-43B3-948B-1728B52AA6E4}">
+                <adec:decorative xmlns:adec="http://schemas.microsoft.com/office/drawing/2017/decorative" val="1"/>
+              </a:ext>
+            </a:extLst>
+          </p:cNvPr>
+          <p:cNvSpPr>
+            <a:spLocks noGrp="1" noRot="1" noChangeAspect="1" noMove="1" noResize="1" noEditPoints="1" noAdjustHandles="1" noChangeArrowheads="1" noChangeShapeType="1" noTextEdit="1"/>
+          </p:cNvSpPr>
+          <p:nvPr>
+            <p:extLst>
+              <p:ext uri="{386F3935-93C4-4BCD-93E2-E3B085C9AB24}">
+                <p16:designElem xmlns:p16="http://schemas.microsoft.com/office/powerpoint/2015/main" val="1"/>
+              </p:ext>
+            </p:extLst>
+          </p:nvPr>
+        </p:nvSpPr>
+        <p:spPr>
+          <a:xfrm>
+            <a:off x="0" y="0"/>
+            <a:ext cx="12192000" cy="6858000"/>
+          </a:xfrm>
+          <a:prstGeom prst="rect">
+            <a:avLst/>
+          </a:prstGeom>
+          <a:ln>
+            <a:noFill/>
+          </a:ln>
+        </p:spPr>
+        <p:style>
+          <a:lnRef idx="2">
+            <a:schemeClr val="accent1">
+              <a:shade val="50000"/>
+            </a:schemeClr>
+          </a:lnRef>
+          <a:fillRef idx="1003">
+            <a:schemeClr val="dk2"/>
+          </a:fillRef>
+          <a:effectRef idx="0">
+            <a:schemeClr val="accent1"/>
+          </a:effectRef>
+          <a:fontRef idx="minor">
+            <a:schemeClr val="lt1"/>
+          </a:fontRef>
+        </p:style>
+        <p:txBody>
+          <a:bodyPr rtlCol="0" anchor="ctr"/>
+          <a:lstStyle/>
+          <a:p>
+            <a:pPr algn="ctr"/>
+            <a:endParaRPr lang="en-US"/>
+          </a:p>
+        </p:txBody>
+      </p:sp>
+      <p:sp>
+        <p:nvSpPr>
+          <p:cNvPr id="24" name="Freeform 31">
+            <a:extLst>
+              <a:ext uri="{FF2B5EF4-FFF2-40B4-BE49-F238E27FC236}">
+                <a16:creationId xmlns:a16="http://schemas.microsoft.com/office/drawing/2014/main" id="{61752F1D-FC0F-4103-9584-630E643CCDA6}"/>
+              </a:ext>
+              <a:ext uri="{C183D7F6-B498-43B3-948B-1728B52AA6E4}">
+                <adec:decorative xmlns:adec="http://schemas.microsoft.com/office/drawing/2017/decorative" val="1"/>
+              </a:ext>
+            </a:extLst>
+          </p:cNvPr>
+          <p:cNvSpPr>
+            <a:spLocks noGrp="1" noRot="1" noChangeAspect="1" noMove="1" noResize="1" noEditPoints="1" noAdjustHandles="1" noChangeArrowheads="1" noChangeShapeType="1" noTextEdit="1"/>
+          </p:cNvSpPr>
+          <p:nvPr>
+            <p:extLst>
+              <p:ext uri="{386F3935-93C4-4BCD-93E2-E3B085C9AB24}">
+                <p16:designElem xmlns:p16="http://schemas.microsoft.com/office/powerpoint/2015/main" val="1"/>
+              </p:ext>
+            </p:extLst>
+          </p:nvPr>
+        </p:nvSpPr>
+        <p:spPr>
+          <a:xfrm>
+            <a:off x="4994020" y="-1"/>
+            <a:ext cx="559472" cy="3709642"/>
+          </a:xfrm>
+          <a:custGeom>
+            <a:avLst/>
+            <a:gdLst>
+              <a:gd name="connsiteX0" fmla="*/ 0 w 559472"/>
+              <a:gd name="connsiteY0" fmla="*/ 0 h 3709642"/>
+              <a:gd name="connsiteX1" fmla="*/ 473952 w 559472"/>
+              <a:gd name="connsiteY1" fmla="*/ 0 h 3709642"/>
+              <a:gd name="connsiteX2" fmla="*/ 485840 w 559472"/>
+              <a:gd name="connsiteY2" fmla="*/ 161194 h 3709642"/>
+              <a:gd name="connsiteX3" fmla="*/ 523949 w 559472"/>
+              <a:gd name="connsiteY3" fmla="*/ 3672197 h 3709642"/>
+              <a:gd name="connsiteX4" fmla="*/ 454748 w 559472"/>
+              <a:gd name="connsiteY4" fmla="*/ 3709642 h 3709642"/>
+              <a:gd name="connsiteX5" fmla="*/ 448224 w 559472"/>
+              <a:gd name="connsiteY5" fmla="*/ 3510471 h 3709642"/>
+              <a:gd name="connsiteX6" fmla="*/ 443564 w 559472"/>
+              <a:gd name="connsiteY6" fmla="*/ 3408563 h 3709642"/>
+              <a:gd name="connsiteX7" fmla="*/ 438902 w 559472"/>
+              <a:gd name="connsiteY7" fmla="*/ 3304407 h 3709642"/>
+              <a:gd name="connsiteX8" fmla="*/ 433941 w 559472"/>
+              <a:gd name="connsiteY8" fmla="*/ 3198777 h 3709642"/>
+              <a:gd name="connsiteX9" fmla="*/ 427584 w 559472"/>
+              <a:gd name="connsiteY9" fmla="*/ 3092510 h 3709642"/>
+              <a:gd name="connsiteX10" fmla="*/ 420988 w 559472"/>
+              <a:gd name="connsiteY10" fmla="*/ 2984390 h 3709642"/>
+              <a:gd name="connsiteX11" fmla="*/ 414330 w 559472"/>
+              <a:gd name="connsiteY11" fmla="*/ 2874401 h 3709642"/>
+              <a:gd name="connsiteX12" fmla="*/ 406840 w 559472"/>
+              <a:gd name="connsiteY12" fmla="*/ 2762980 h 3709642"/>
+              <a:gd name="connsiteX13" fmla="*/ 397745 w 559472"/>
+              <a:gd name="connsiteY13" fmla="*/ 2650566 h 3709642"/>
+              <a:gd name="connsiteX14" fmla="*/ 389154 w 559472"/>
+              <a:gd name="connsiteY14" fmla="*/ 2536612 h 3709642"/>
+              <a:gd name="connsiteX15" fmla="*/ 379225 w 559472"/>
+              <a:gd name="connsiteY15" fmla="*/ 2421642 h 3709642"/>
+              <a:gd name="connsiteX16" fmla="*/ 368316 w 559472"/>
+              <a:gd name="connsiteY16" fmla="*/ 2305627 h 3709642"/>
+              <a:gd name="connsiteX17" fmla="*/ 357466 w 559472"/>
+              <a:gd name="connsiteY17" fmla="*/ 2189233 h 3709642"/>
+              <a:gd name="connsiteX18" fmla="*/ 344982 w 559472"/>
+              <a:gd name="connsiteY18" fmla="*/ 2071473 h 3709642"/>
+              <a:gd name="connsiteX19" fmla="*/ 332466 w 559472"/>
+              <a:gd name="connsiteY19" fmla="*/ 1952216 h 3709642"/>
+              <a:gd name="connsiteX20" fmla="*/ 319121 w 559472"/>
+              <a:gd name="connsiteY20" fmla="*/ 1833776 h 3709642"/>
+              <a:gd name="connsiteX21" fmla="*/ 304408 w 559472"/>
+              <a:gd name="connsiteY21" fmla="*/ 1713948 h 3709642"/>
+              <a:gd name="connsiteX22" fmla="*/ 288685 w 559472"/>
+              <a:gd name="connsiteY22" fmla="*/ 1592703 h 3709642"/>
+              <a:gd name="connsiteX23" fmla="*/ 273050 w 559472"/>
+              <a:gd name="connsiteY23" fmla="*/ 1471451 h 3709642"/>
+              <a:gd name="connsiteX24" fmla="*/ 255813 w 559472"/>
+              <a:gd name="connsiteY24" fmla="*/ 1350328 h 3709642"/>
+              <a:gd name="connsiteX25" fmla="*/ 237060 w 559472"/>
+              <a:gd name="connsiteY25" fmla="*/ 1227080 h 3709642"/>
+              <a:gd name="connsiteX26" fmla="*/ 218488 w 559472"/>
+              <a:gd name="connsiteY26" fmla="*/ 1106065 h 3709642"/>
+              <a:gd name="connsiteX27" fmla="*/ 198221 w 559472"/>
+              <a:gd name="connsiteY27" fmla="*/ 982940 h 3709642"/>
+              <a:gd name="connsiteX28" fmla="*/ 177152 w 559472"/>
+              <a:gd name="connsiteY28" fmla="*/ 858755 h 3709642"/>
+              <a:gd name="connsiteX29" fmla="*/ 155551 w 559472"/>
+              <a:gd name="connsiteY29" fmla="*/ 736861 h 3709642"/>
+              <a:gd name="connsiteX30" fmla="*/ 131782 w 559472"/>
+              <a:gd name="connsiteY30" fmla="*/ 613645 h 3709642"/>
+              <a:gd name="connsiteX31" fmla="*/ 107123 w 559472"/>
+              <a:gd name="connsiteY31" fmla="*/ 490500 h 3709642"/>
+              <a:gd name="connsiteX32" fmla="*/ 82552 w 559472"/>
+              <a:gd name="connsiteY32" fmla="*/ 367348 h 3709642"/>
+              <a:gd name="connsiteX33" fmla="*/ 55608 w 559472"/>
+              <a:gd name="connsiteY33" fmla="*/ 244762 h 3709642"/>
+              <a:gd name="connsiteX34" fmla="*/ 28130 w 559472"/>
+              <a:gd name="connsiteY34" fmla="*/ 122220 h 3709642"/>
+              <a:gd name="connsiteX35" fmla="*/ 0 w 559472"/>
+              <a:gd name="connsiteY35" fmla="*/ 0 h 3709642"/>
+            </a:gdLst>
+            <a:ahLst/>
+            <a:cxnLst>
+              <a:cxn ang="0">
+                <a:pos x="connsiteX0" y="connsiteY0"/>
+              </a:cxn>
+              <a:cxn ang="0">
+                <a:pos x="connsiteX1" y="connsiteY1"/>
+              </a:cxn>
+              <a:cxn ang="0">
+                <a:pos x="connsiteX2" y="connsiteY2"/>
+              </a:cxn>
+              <a:cxn ang="0">
+                <a:pos x="connsiteX3" y="connsiteY3"/>
+              </a:cxn>
+              <a:cxn ang="0">
+                <a:pos x="connsiteX4" y="connsiteY4"/>
+              </a:cxn>
+              <a:cxn ang="0">
+                <a:pos x="connsiteX5" y="connsiteY5"/>
+              </a:cxn>
+              <a:cxn ang="0">
+                <a:pos x="connsiteX6" y="connsiteY6"/>
+              </a:cxn>
+              <a:cxn ang="0">
+                <a:pos x="connsiteX7" y="connsiteY7"/>
+              </a:cxn>
+              <a:cxn ang="0">
+                <a:pos x="connsiteX8" y="connsiteY8"/>
+              </a:cxn>
+              <a:cxn ang="0">
+                <a:pos x="connsiteX9" y="connsiteY9"/>
+              </a:cxn>
+              <a:cxn ang="0">
+                <a:pos x="connsiteX10" y="connsiteY10"/>
+              </a:cxn>
+              <a:cxn ang="0">
+                <a:pos x="connsiteX11" y="connsiteY11"/>
+              </a:cxn>
+              <a:cxn ang="0">
+                <a:pos x="connsiteX12" y="connsiteY12"/>
+              </a:cxn>
+              <a:cxn ang="0">
+                <a:pos x="connsiteX13" y="connsiteY13"/>
+              </a:cxn>
+              <a:cxn ang="0">
+                <a:pos x="connsiteX14" y="connsiteY14"/>
+              </a:cxn>
+              <a:cxn ang="0">
+                <a:pos x="connsiteX15" y="connsiteY15"/>
+              </a:cxn>
+              <a:cxn ang="0">
+                <a:pos x="connsiteX16" y="connsiteY16"/>
+              </a:cxn>
+              <a:cxn ang="0">
+                <a:pos x="connsiteX17" y="connsiteY17"/>
+              </a:cxn>
+              <a:cxn ang="0">
+                <a:pos x="connsiteX18" y="connsiteY18"/>
+              </a:cxn>
+              <a:cxn ang="0">
+                <a:pos x="connsiteX19" y="connsiteY19"/>
+              </a:cxn>
+              <a:cxn ang="0">
+                <a:pos x="connsiteX20" y="connsiteY20"/>
+              </a:cxn>
+              <a:cxn ang="0">
+                <a:pos x="connsiteX21" y="connsiteY21"/>
+              </a:cxn>
+              <a:cxn ang="0">
+                <a:pos x="connsiteX22" y="connsiteY22"/>
+              </a:cxn>
+              <a:cxn ang="0">
+                <a:pos x="connsiteX23" y="connsiteY23"/>
+              </a:cxn>
+              <a:cxn ang="0">
+                <a:pos x="connsiteX24" y="connsiteY24"/>
+              </a:cxn>
+              <a:cxn ang="0">
+                <a:pos x="connsiteX25" y="connsiteY25"/>
+              </a:cxn>
+              <a:cxn ang="0">
+                <a:pos x="connsiteX26" y="connsiteY26"/>
+              </a:cxn>
+              <a:cxn ang="0">
+                <a:pos x="connsiteX27" y="connsiteY27"/>
+              </a:cxn>
+              <a:cxn ang="0">
+                <a:pos x="connsiteX28" y="connsiteY28"/>
+              </a:cxn>
+              <a:cxn ang="0">
+                <a:pos x="connsiteX29" y="connsiteY29"/>
+              </a:cxn>
+              <a:cxn ang="0">
+                <a:pos x="connsiteX30" y="connsiteY30"/>
+              </a:cxn>
+              <a:cxn ang="0">
+                <a:pos x="connsiteX31" y="connsiteY31"/>
+              </a:cxn>
+              <a:cxn ang="0">
+                <a:pos x="connsiteX32" y="connsiteY32"/>
+              </a:cxn>
+              <a:cxn ang="0">
+                <a:pos x="connsiteX33" y="connsiteY33"/>
+              </a:cxn>
+              <a:cxn ang="0">
+                <a:pos x="connsiteX34" y="connsiteY34"/>
+              </a:cxn>
+              <a:cxn ang="0">
+                <a:pos x="connsiteX35" y="connsiteY35"/>
+              </a:cxn>
+            </a:cxnLst>
+            <a:rect l="l" t="t" r="r" b="b"/>
+            <a:pathLst>
+              <a:path w="559472" h="3709642">
+                <a:moveTo>
+                  <a:pt x="0" y="0"/>
+                </a:moveTo>
+                <a:lnTo>
+                  <a:pt x="473952" y="0"/>
+                </a:lnTo>
+                <a:lnTo>
+                  <a:pt x="485840" y="161194"/>
+                </a:lnTo>
+                <a:cubicBezTo>
+                  <a:pt x="552063" y="1147770"/>
+                  <a:pt x="592441" y="3086737"/>
+                  <a:pt x="523949" y="3672197"/>
+                </a:cubicBezTo>
+                <a:cubicBezTo>
+                  <a:pt x="500842" y="3684557"/>
+                  <a:pt x="477855" y="3697282"/>
+                  <a:pt x="454748" y="3709642"/>
+                </a:cubicBezTo>
+                <a:lnTo>
+                  <a:pt x="448224" y="3510471"/>
+                </a:lnTo>
+                <a:lnTo>
+                  <a:pt x="443564" y="3408563"/>
+                </a:lnTo>
+                <a:lnTo>
+                  <a:pt x="438902" y="3304407"/>
+                </a:lnTo>
+                <a:lnTo>
+                  <a:pt x="433941" y="3198777"/>
+                </a:lnTo>
+                <a:lnTo>
+                  <a:pt x="427584" y="3092510"/>
+                </a:lnTo>
+                <a:lnTo>
+                  <a:pt x="420988" y="2984390"/>
+                </a:lnTo>
+                <a:lnTo>
+                  <a:pt x="414330" y="2874401"/>
+                </a:lnTo>
+                <a:lnTo>
+                  <a:pt x="406840" y="2762980"/>
+                </a:lnTo>
+                <a:lnTo>
+                  <a:pt x="397745" y="2650566"/>
+                </a:lnTo>
+                <a:lnTo>
+                  <a:pt x="389154" y="2536612"/>
+                </a:lnTo>
+                <a:lnTo>
+                  <a:pt x="379225" y="2421642"/>
+                </a:lnTo>
+                <a:lnTo>
+                  <a:pt x="368316" y="2305627"/>
+                </a:lnTo>
+                <a:lnTo>
+                  <a:pt x="357466" y="2189233"/>
+                </a:lnTo>
+                <a:lnTo>
+                  <a:pt x="344982" y="2071473"/>
+                </a:lnTo>
+                <a:lnTo>
+                  <a:pt x="332466" y="1952216"/>
+                </a:lnTo>
+                <a:lnTo>
+                  <a:pt x="319121" y="1833776"/>
+                </a:lnTo>
+                <a:lnTo>
+                  <a:pt x="304408" y="1713948"/>
+                </a:lnTo>
+                <a:lnTo>
+                  <a:pt x="288685" y="1592703"/>
+                </a:lnTo>
+                <a:lnTo>
+                  <a:pt x="273050" y="1471451"/>
+                </a:lnTo>
+                <a:lnTo>
+                  <a:pt x="255813" y="1350328"/>
+                </a:lnTo>
+                <a:lnTo>
+                  <a:pt x="237060" y="1227080"/>
+                </a:lnTo>
+                <a:lnTo>
+                  <a:pt x="218488" y="1106065"/>
+                </a:lnTo>
+                <a:lnTo>
+                  <a:pt x="198221" y="982940"/>
+                </a:lnTo>
+                <a:lnTo>
+                  <a:pt x="177152" y="858755"/>
+                </a:lnTo>
+                <a:lnTo>
+                  <a:pt x="155551" y="736861"/>
+                </a:lnTo>
+                <a:lnTo>
+                  <a:pt x="131782" y="613645"/>
+                </a:lnTo>
+                <a:lnTo>
+                  <a:pt x="107123" y="490500"/>
+                </a:lnTo>
+                <a:lnTo>
+                  <a:pt x="82552" y="367348"/>
+                </a:lnTo>
+                <a:lnTo>
+                  <a:pt x="55608" y="244762"/>
+                </a:lnTo>
+                <a:lnTo>
+                  <a:pt x="28130" y="122220"/>
+                </a:lnTo>
+                <a:lnTo>
+                  <a:pt x="0" y="0"/>
+                </a:lnTo>
+                <a:close/>
+              </a:path>
+            </a:pathLst>
+          </a:custGeom>
+          <a:solidFill>
+            <a:schemeClr val="bg1">
+              <a:alpha val="20000"/>
+            </a:schemeClr>
+          </a:solidFill>
+          <a:ln>
+            <a:noFill/>
+          </a:ln>
+        </p:spPr>
+        <p:txBody>
+          <a:bodyPr rtlCol="0" anchor="ctr"/>
+          <a:lstStyle/>
+          <a:p>
+            <a:pPr algn="ctr"/>
+            <a:endParaRPr lang="en-US"/>
+          </a:p>
+        </p:txBody>
+      </p:sp>
+      <p:sp useBgFill="1">
+        <p:nvSpPr>
+          <p:cNvPr id="26" name="Rectangle 25">
+            <a:extLst>
+              <a:ext uri="{FF2B5EF4-FFF2-40B4-BE49-F238E27FC236}">
+                <a16:creationId xmlns:a16="http://schemas.microsoft.com/office/drawing/2014/main" id="{126C04EF-6428-472D-B316-74A19385B08F}"/>
+              </a:ext>
+              <a:ext uri="{C183D7F6-B498-43B3-948B-1728B52AA6E4}">
+                <adec:decorative xmlns:adec="http://schemas.microsoft.com/office/drawing/2017/decorative" val="1"/>
+              </a:ext>
+            </a:extLst>
+          </p:cNvPr>
+          <p:cNvSpPr>
+            <a:spLocks noGrp="1" noRot="1" noChangeAspect="1" noMove="1" noResize="1" noEditPoints="1" noAdjustHandles="1" noChangeArrowheads="1" noChangeShapeType="1" noTextEdit="1"/>
+          </p:cNvSpPr>
+          <p:nvPr>
+            <p:extLst>
+              <p:ext uri="{386F3935-93C4-4BCD-93E2-E3B085C9AB24}">
+                <p16:designElem xmlns:p16="http://schemas.microsoft.com/office/powerpoint/2015/main" val="1"/>
+              </p:ext>
+            </p:extLst>
+          </p:nvPr>
+        </p:nvSpPr>
+        <p:spPr>
+          <a:xfrm>
+            <a:off x="6093992" y="0"/>
+            <a:ext cx="6098427" cy="6858000"/>
+          </a:xfrm>
+          <a:prstGeom prst="rect">
+            <a:avLst/>
+          </a:prstGeom>
+          <a:ln>
+            <a:noFill/>
+          </a:ln>
+        </p:spPr>
+        <p:style>
+          <a:lnRef idx="2">
+            <a:schemeClr val="accent1">
+              <a:shade val="50000"/>
+            </a:schemeClr>
+          </a:lnRef>
+          <a:fillRef idx="1">
+            <a:schemeClr val="accent1"/>
+          </a:fillRef>
+          <a:effectRef idx="0">
+            <a:schemeClr val="accent1"/>
+          </a:effectRef>
+          <a:fontRef idx="minor">
+            <a:schemeClr val="lt1"/>
+          </a:fontRef>
+        </p:style>
+        <p:txBody>
+          <a:bodyPr rtlCol="0" anchor="ctr"/>
+          <a:lstStyle/>
+          <a:p>
+            <a:pPr algn="ctr"/>
+            <a:endParaRPr lang="en-US"/>
+          </a:p>
+        </p:txBody>
+      </p:sp>
+      <p:sp useBgFill="1">
+        <p:nvSpPr>
+          <p:cNvPr id="28" name="Freeform 5">
+            <a:extLst>
+              <a:ext uri="{FF2B5EF4-FFF2-40B4-BE49-F238E27FC236}">
+                <a16:creationId xmlns:a16="http://schemas.microsoft.com/office/drawing/2014/main" id="{AE50896D-AACB-4C0A-855D-ECEFB4A0DA9A}"/>
+              </a:ext>
+              <a:ext uri="{C183D7F6-B498-43B3-948B-1728B52AA6E4}">
+                <adec:decorative xmlns:adec="http://schemas.microsoft.com/office/drawing/2017/decorative" val="1"/>
+              </a:ext>
+            </a:extLst>
+          </p:cNvPr>
+          <p:cNvSpPr>
+            <a:spLocks noGrp="1" noRot="1" noChangeAspect="1" noMove="1" noResize="1" noEditPoints="1" noAdjustHandles="1" noChangeArrowheads="1" noChangeShapeType="1" noTextEdit="1"/>
+          </p:cNvSpPr>
+          <p:nvPr>
+            <p:extLst>
+              <p:ext uri="{386F3935-93C4-4BCD-93E2-E3B085C9AB24}">
+                <p16:designElem xmlns:p16="http://schemas.microsoft.com/office/powerpoint/2015/main" val="1"/>
+              </p:ext>
+            </p:extLst>
+          </p:nvPr>
+        </p:nvSpPr>
+        <p:spPr bwMode="gray">
+          <a:xfrm rot="16200000">
+            <a:off x="2450577" y="2756642"/>
+            <a:ext cx="6858000" cy="1344715"/>
+          </a:xfrm>
+          <a:custGeom>
+            <a:avLst/>
+            <a:gdLst/>
+            <a:ahLst/>
+            <a:cxnLst/>
+            <a:rect l="l" t="t" r="r" b="b"/>
+            <a:pathLst>
+              <a:path w="10000" h="8000">
+                <a:moveTo>
+                  <a:pt x="0" y="0"/>
+                </a:moveTo>
+                <a:lnTo>
+                  <a:pt x="0" y="7970"/>
+                </a:lnTo>
+                <a:lnTo>
+                  <a:pt x="10000" y="8000"/>
+                </a:lnTo>
+                <a:lnTo>
+                  <a:pt x="10000" y="7"/>
+                </a:lnTo>
+                <a:lnTo>
+                  <a:pt x="10000" y="7"/>
+                </a:lnTo>
+                <a:lnTo>
+                  <a:pt x="9773" y="156"/>
+                </a:lnTo>
+                <a:lnTo>
+                  <a:pt x="9547" y="298"/>
+                </a:lnTo>
+                <a:lnTo>
+                  <a:pt x="9320" y="437"/>
+                </a:lnTo>
+                <a:lnTo>
+                  <a:pt x="9092" y="556"/>
+                </a:lnTo>
+                <a:lnTo>
+                  <a:pt x="8865" y="676"/>
+                </a:lnTo>
+                <a:lnTo>
+                  <a:pt x="8637" y="788"/>
+                </a:lnTo>
+                <a:lnTo>
+                  <a:pt x="8412" y="884"/>
+                </a:lnTo>
+                <a:lnTo>
+                  <a:pt x="8184" y="975"/>
+                </a:lnTo>
+                <a:lnTo>
+                  <a:pt x="7957" y="1058"/>
+                </a:lnTo>
+                <a:lnTo>
+                  <a:pt x="7734" y="1130"/>
+                </a:lnTo>
+                <a:lnTo>
+                  <a:pt x="7508" y="1202"/>
+                </a:lnTo>
+                <a:lnTo>
+                  <a:pt x="7285" y="1262"/>
+                </a:lnTo>
+                <a:lnTo>
+                  <a:pt x="7062" y="1309"/>
+                </a:lnTo>
+                <a:lnTo>
+                  <a:pt x="6840" y="1358"/>
+                </a:lnTo>
+                <a:lnTo>
+                  <a:pt x="6620" y="1399"/>
+                </a:lnTo>
+                <a:lnTo>
+                  <a:pt x="6402" y="1428"/>
+                </a:lnTo>
+                <a:lnTo>
+                  <a:pt x="6184" y="1453"/>
+                </a:lnTo>
+                <a:lnTo>
+                  <a:pt x="5968" y="1477"/>
+                </a:lnTo>
+                <a:lnTo>
+                  <a:pt x="5755" y="1488"/>
+                </a:lnTo>
+                <a:lnTo>
+                  <a:pt x="5542" y="1500"/>
+                </a:lnTo>
+                <a:lnTo>
+                  <a:pt x="5332" y="1506"/>
+                </a:lnTo>
+                <a:lnTo>
+                  <a:pt x="5124" y="1500"/>
+                </a:lnTo>
+                <a:lnTo>
+                  <a:pt x="4918" y="1500"/>
+                </a:lnTo>
+                <a:lnTo>
+                  <a:pt x="4714" y="1488"/>
+                </a:lnTo>
+                <a:lnTo>
+                  <a:pt x="4514" y="1470"/>
+                </a:lnTo>
+                <a:lnTo>
+                  <a:pt x="4316" y="1453"/>
+                </a:lnTo>
+                <a:lnTo>
+                  <a:pt x="4122" y="1434"/>
+                </a:lnTo>
+                <a:lnTo>
+                  <a:pt x="3929" y="1405"/>
+                </a:lnTo>
+                <a:lnTo>
+                  <a:pt x="3739" y="1374"/>
+                </a:lnTo>
+                <a:lnTo>
+                  <a:pt x="3553" y="1346"/>
+                </a:lnTo>
+                <a:lnTo>
+                  <a:pt x="3190" y="1267"/>
+                </a:lnTo>
+                <a:lnTo>
+                  <a:pt x="2842" y="1183"/>
+                </a:lnTo>
+                <a:lnTo>
+                  <a:pt x="2508" y="1095"/>
+                </a:lnTo>
+                <a:lnTo>
+                  <a:pt x="2192" y="998"/>
+                </a:lnTo>
+                <a:lnTo>
+                  <a:pt x="1890" y="897"/>
+                </a:lnTo>
+                <a:lnTo>
+                  <a:pt x="1610" y="788"/>
+                </a:lnTo>
+                <a:lnTo>
+                  <a:pt x="1347" y="681"/>
+                </a:lnTo>
+                <a:lnTo>
+                  <a:pt x="1105" y="574"/>
+                </a:lnTo>
+                <a:lnTo>
+                  <a:pt x="883" y="473"/>
+                </a:lnTo>
+                <a:lnTo>
+                  <a:pt x="686" y="377"/>
+                </a:lnTo>
+                <a:lnTo>
+                  <a:pt x="508" y="286"/>
+                </a:lnTo>
+                <a:lnTo>
+                  <a:pt x="358" y="210"/>
+                </a:lnTo>
+                <a:lnTo>
+                  <a:pt x="232" y="138"/>
+                </a:lnTo>
+                <a:lnTo>
+                  <a:pt x="59" y="35"/>
+                </a:lnTo>
+                <a:lnTo>
+                  <a:pt x="0" y="0"/>
+                </a:lnTo>
+                <a:lnTo>
+                  <a:pt x="0" y="0"/>
+                </a:lnTo>
+                <a:close/>
+              </a:path>
+            </a:pathLst>
+          </a:custGeom>
+          <a:ln>
+            <a:noFill/>
+          </a:ln>
+        </p:spPr>
+      </p:sp>
+      <p:pic>
+        <p:nvPicPr>
+          <p:cNvPr id="5" name="Content Placeholder 5">
+            <a:extLst>
+              <a:ext uri="{FF2B5EF4-FFF2-40B4-BE49-F238E27FC236}">
+                <a16:creationId xmlns:a16="http://schemas.microsoft.com/office/drawing/2014/main" id="{2EDC66CA-C6DB-438E-8594-C35007D21C9C}"/>
+              </a:ext>
+            </a:extLst>
+          </p:cNvPr>
+          <p:cNvPicPr>
+            <a:picLocks noGrp="1" noChangeAspect="1"/>
+          </p:cNvPicPr>
+          <p:nvPr>
+            <p:ph sz="half" idx="2"/>
+          </p:nvPr>
+        </p:nvPicPr>
+        <p:blipFill>
+          <a:blip r:embed="rId6"/>
+          <a:stretch>
+            <a:fillRect/>
+          </a:stretch>
+        </p:blipFill>
+        <p:spPr>
+          <a:xfrm>
+            <a:off x="6093992" y="1649974"/>
+            <a:ext cx="5449889" cy="3558048"/>
+          </a:xfrm>
+          <a:prstGeom prst="rect">
+            <a:avLst/>
+          </a:prstGeom>
+          <a:effectLst/>
+        </p:spPr>
+      </p:pic>
+      <p:sp>
+        <p:nvSpPr>
+          <p:cNvPr id="30" name="Rectangle 29">
+            <a:extLst>
+              <a:ext uri="{FF2B5EF4-FFF2-40B4-BE49-F238E27FC236}">
+                <a16:creationId xmlns:a16="http://schemas.microsoft.com/office/drawing/2014/main" id="{A92A1116-1C84-41DF-B803-1F7B0883EC82}"/>
+              </a:ext>
+              <a:ext uri="{C183D7F6-B498-43B3-948B-1728B52AA6E4}">
+                <adec:decorative xmlns:adec="http://schemas.microsoft.com/office/drawing/2017/decorative" val="1"/>
+              </a:ext>
+            </a:extLst>
+          </p:cNvPr>
+          <p:cNvSpPr>
+            <a:spLocks noGrp="1" noRot="1" noChangeAspect="1" noMove="1" noResize="1" noEditPoints="1" noAdjustHandles="1" noChangeArrowheads="1" noChangeShapeType="1" noTextEdit="1"/>
+          </p:cNvSpPr>
+          <p:nvPr>
+            <p:extLst>
+              <p:ext uri="{386F3935-93C4-4BCD-93E2-E3B085C9AB24}">
+                <p16:designElem xmlns:p16="http://schemas.microsoft.com/office/powerpoint/2015/main" val="1"/>
+              </p:ext>
+            </p:extLst>
+          </p:nvPr>
+        </p:nvSpPr>
+        <p:spPr>
+          <a:xfrm>
+            <a:off x="10442448" y="0"/>
+            <a:ext cx="685800" cy="1143000"/>
+          </a:xfrm>
+          <a:prstGeom prst="rect">
+            <a:avLst/>
+          </a:prstGeom>
+          <a:solidFill>
+            <a:schemeClr val="accent1"/>
+          </a:solidFill>
+          <a:ln>
+            <a:noFill/>
+          </a:ln>
+        </p:spPr>
+        <p:style>
+          <a:lnRef idx="1">
+            <a:schemeClr val="accent1"/>
+          </a:lnRef>
+          <a:fillRef idx="3">
+            <a:schemeClr val="accent1"/>
+          </a:fillRef>
+          <a:effectRef idx="2">
+            <a:schemeClr val="accent1"/>
+          </a:effectRef>
+          <a:fontRef idx="minor">
+            <a:schemeClr val="lt1"/>
+          </a:fontRef>
+        </p:style>
+      </p:sp>
+      <p:sp>
+        <p:nvSpPr>
+          <p:cNvPr id="2" name="Title 1">
+            <a:extLst>
+              <a:ext uri="{FF2B5EF4-FFF2-40B4-BE49-F238E27FC236}">
+                <a16:creationId xmlns:a16="http://schemas.microsoft.com/office/drawing/2014/main" id="{9ACF2F38-47EE-4A27-8931-E388A1E9314E}"/>
+              </a:ext>
+            </a:extLst>
+          </p:cNvPr>
+          <p:cNvSpPr>
+            <a:spLocks noGrp="1"/>
+          </p:cNvSpPr>
+          <p:nvPr>
+            <p:ph type="title"/>
+          </p:nvPr>
+        </p:nvSpPr>
+        <p:spPr>
+          <a:xfrm>
+            <a:off x="648931" y="629266"/>
+            <a:ext cx="4166510" cy="1622321"/>
+          </a:xfrm>
+        </p:spPr>
+        <p:txBody>
+          <a:bodyPr vert="horz" lIns="91440" tIns="45720" rIns="91440" bIns="45720" rtlCol="0" anchor="t">
+            <a:normAutofit/>
+          </a:bodyPr>
+          <a:lstStyle/>
+          <a:p>
+            <a:r>
+              <a:rPr lang="en-US" dirty="0">
+                <a:solidFill>
+                  <a:srgbClr val="EBEBEB"/>
+                </a:solidFill>
+              </a:rPr>
+              <a:t>HEAD</a:t>
+            </a:r>
+            <a:endParaRPr lang="en-US" sz="4200" b="0" i="0" kern="1200" dirty="0">
+              <a:solidFill>
+                <a:srgbClr val="EBEBEB"/>
+              </a:solidFill>
+              <a:latin typeface="+mj-lt"/>
+              <a:ea typeface="+mj-ea"/>
+              <a:cs typeface="+mj-cs"/>
+            </a:endParaRPr>
+          </a:p>
+        </p:txBody>
+      </p:sp>
+      <p:sp>
+        <p:nvSpPr>
+          <p:cNvPr id="3" name="Content Placeholder 2">
+            <a:extLst>
+              <a:ext uri="{FF2B5EF4-FFF2-40B4-BE49-F238E27FC236}">
+                <a16:creationId xmlns:a16="http://schemas.microsoft.com/office/drawing/2014/main" id="{AFD8C09D-7118-478A-AE85-A290A04ED81B}"/>
+              </a:ext>
+            </a:extLst>
+          </p:cNvPr>
+          <p:cNvSpPr>
+            <a:spLocks noGrp="1"/>
+          </p:cNvSpPr>
+          <p:nvPr>
+            <p:ph sz="half" idx="1"/>
+          </p:nvPr>
+        </p:nvSpPr>
+        <p:spPr>
+          <a:xfrm>
+            <a:off x="648931" y="2438400"/>
+            <a:ext cx="4166509" cy="3785419"/>
+          </a:xfrm>
+        </p:spPr>
+        <p:txBody>
+          <a:bodyPr vert="horz" lIns="91440" tIns="45720" rIns="91440" bIns="45720" rtlCol="0">
+            <a:normAutofit/>
+          </a:bodyPr>
+          <a:lstStyle/>
+          <a:p>
+            <a:r>
+              <a:rPr lang="en-US" dirty="0">
+                <a:solidFill>
+                  <a:srgbClr val="FFFFFF"/>
+                </a:solidFill>
+              </a:rPr>
+              <a:t>HEAD refers to the latest commit</a:t>
+            </a:r>
+          </a:p>
+          <a:p>
+            <a:endParaRPr lang="en-US" dirty="0">
+              <a:solidFill>
+                <a:srgbClr val="EBEBEB"/>
+              </a:solidFill>
+            </a:endParaRPr>
+          </a:p>
+        </p:txBody>
+      </p:sp>
+    </p:spTree>
+    <p:extLst>
+      <p:ext uri="{BB962C8B-B14F-4D97-AF65-F5344CB8AC3E}">
+        <p14:creationId xmlns:p14="http://schemas.microsoft.com/office/powerpoint/2010/main" val="2786820525"/>
+      </p:ext>
+    </p:extLst>
+  </p:cSld>
+  <p:clrMapOvr>
+    <a:overrideClrMapping bg1="lt1" tx1="dk1" bg2="lt2" tx2="dk2" accent1="accent1" accent2="accent2" accent3="accent3" accent4="accent4" accent5="accent5" accent6="accent6" hlink="hlink" folHlink="folHlink"/>
+  </p:clrMapOvr>
+</p:sld>
+</file>
+
+<file path=ppt/slides/slide7.xml><?xml version="1.0" encoding="utf-8"?>
 <p:sld xmlns:a="http://schemas.openxmlformats.org/drawingml/2006/main" xmlns:r="http://schemas.openxmlformats.org/officeDocument/2006/relationships" xmlns:p="http://schemas.openxmlformats.org/presentationml/2006/main">
   <p:cSld>
     <p:spTree>
@@ -9035,6 +11627,129 @@
       </p:grpSpPr>
       <p:sp>
         <p:nvSpPr>
+          <p:cNvPr id="3" name="Content Placeholder 2">
+            <a:extLst>
+              <a:ext uri="{FF2B5EF4-FFF2-40B4-BE49-F238E27FC236}">
+                <a16:creationId xmlns:a16="http://schemas.microsoft.com/office/drawing/2014/main" id="{DF07826F-0B22-7245-B547-F198DDAFCE11}"/>
+              </a:ext>
+            </a:extLst>
+          </p:cNvPr>
+          <p:cNvSpPr>
+            <a:spLocks noGrp="1"/>
+          </p:cNvSpPr>
+          <p:nvPr>
+            <p:ph idx="1"/>
+          </p:nvPr>
+        </p:nvSpPr>
+        <p:spPr>
+          <a:xfrm>
+            <a:off x="858644" y="557562"/>
+            <a:ext cx="9191209" cy="5690838"/>
+          </a:xfrm>
+        </p:spPr>
+        <p:txBody>
+          <a:bodyPr/>
+          <a:lstStyle/>
+          <a:p>
+            <a:pPr>
+              <a:lnSpc>
+                <a:spcPct val="200000"/>
+              </a:lnSpc>
+            </a:pPr>
+            <a:r>
+              <a:rPr lang="en-US" dirty="0"/>
+              <a:t>Git is </a:t>
+            </a:r>
+            <a:r>
+              <a:rPr lang="en-US" b="1" dirty="0"/>
+              <a:t>locally enabled</a:t>
+            </a:r>
+            <a:r>
+              <a:rPr lang="en-US" dirty="0"/>
+              <a:t> so you can version control items just on your desktop.</a:t>
+            </a:r>
+          </a:p>
+          <a:p>
+            <a:pPr>
+              <a:lnSpc>
+                <a:spcPct val="200000"/>
+              </a:lnSpc>
+            </a:pPr>
+            <a:r>
+              <a:rPr lang="en-US" b="1" dirty="0"/>
+              <a:t>Team-centric: </a:t>
+            </a:r>
+            <a:r>
+              <a:rPr lang="en-US" dirty="0"/>
+              <a:t>It allows teams to work in sequential or parallel fashion (using feature branches) and </a:t>
+            </a:r>
+            <a:r>
+              <a:rPr lang="en-US" b="1" dirty="0"/>
+              <a:t>merge</a:t>
+            </a:r>
+            <a:r>
+              <a:rPr lang="en-US" dirty="0"/>
+              <a:t> their code to complete the project.</a:t>
+            </a:r>
+            <a:endParaRPr lang="en-US" b="1" dirty="0"/>
+          </a:p>
+          <a:p>
+            <a:pPr>
+              <a:lnSpc>
+                <a:spcPct val="200000"/>
+              </a:lnSpc>
+            </a:pPr>
+            <a:r>
+              <a:rPr lang="en-US" b="1" dirty="0"/>
+              <a:t>History tracking</a:t>
+            </a:r>
+            <a:r>
+              <a:rPr lang="en-US" dirty="0"/>
+              <a:t>: You can see a history of all your commits since the beginning of your project thanks to Git.</a:t>
+            </a:r>
+          </a:p>
+          <a:p>
+            <a:pPr>
+              <a:lnSpc>
+                <a:spcPct val="200000"/>
+              </a:lnSpc>
+            </a:pPr>
+            <a:endParaRPr lang="en-US" dirty="0"/>
+          </a:p>
+        </p:txBody>
+      </p:sp>
+    </p:spTree>
+    <p:extLst>
+      <p:ext uri="{BB962C8B-B14F-4D97-AF65-F5344CB8AC3E}">
+        <p14:creationId xmlns:p14="http://schemas.microsoft.com/office/powerpoint/2010/main" val="612575497"/>
+      </p:ext>
+    </p:extLst>
+  </p:cSld>
+  <p:clrMapOvr>
+    <a:masterClrMapping/>
+  </p:clrMapOvr>
+</p:sld>
+</file>
+
+<file path=ppt/slides/slide8.xml><?xml version="1.0" encoding="utf-8"?>
+<p:sld xmlns:a="http://schemas.openxmlformats.org/drawingml/2006/main" xmlns:r="http://schemas.openxmlformats.org/officeDocument/2006/relationships" xmlns:p="http://schemas.openxmlformats.org/presentationml/2006/main">
+  <p:cSld>
+    <p:spTree>
+      <p:nvGrpSpPr>
+        <p:cNvPr id="1" name=""/>
+        <p:cNvGrpSpPr/>
+        <p:nvPr/>
+      </p:nvGrpSpPr>
+      <p:grpSpPr>
+        <a:xfrm>
+          <a:off x="0" y="0"/>
+          <a:ext cx="0" cy="0"/>
+          <a:chOff x="0" y="0"/>
+          <a:chExt cx="0" cy="0"/>
+        </a:xfrm>
+      </p:grpSpPr>
+      <p:sp>
+        <p:nvSpPr>
           <p:cNvPr id="2" name="Title 1">
             <a:extLst>
               <a:ext uri="{FF2B5EF4-FFF2-40B4-BE49-F238E27FC236}">
@@ -9248,7 +11963,7 @@
 </p:sld>
 </file>
 
-<file path=ppt/slides/slide7.xml><?xml version="1.0" encoding="utf-8"?>
+<file path=ppt/slides/slide9.xml><?xml version="1.0" encoding="utf-8"?>
 <p:sld xmlns:a="http://schemas.openxmlformats.org/drawingml/2006/main" xmlns:r="http://schemas.openxmlformats.org/officeDocument/2006/relationships" xmlns:p="http://schemas.openxmlformats.org/presentationml/2006/main">
   <p:cSld>
     <p:spTree>

</xml_diff>